<commit_message>
Rest of Unit6 uploaded
</commit_message>
<xml_diff>
--- a/Unit 5-6 Definitions.pptx
+++ b/Unit 5-6 Definitions.pptx
@@ -5,7 +5,7 @@
     <p:sldMasterId id="2147483648" r:id="rId1"/>
   </p:sldMasterIdLst>
   <p:notesMasterIdLst>
-    <p:notesMasterId r:id="rId18"/>
+    <p:notesMasterId r:id="rId21"/>
   </p:notesMasterIdLst>
   <p:sldIdLst>
     <p:sldId id="256" r:id="rId2"/>
@@ -24,6 +24,9 @@
     <p:sldId id="264" r:id="rId15"/>
     <p:sldId id="265" r:id="rId16"/>
     <p:sldId id="266" r:id="rId17"/>
+    <p:sldId id="279" r:id="rId18"/>
+    <p:sldId id="280" r:id="rId19"/>
+    <p:sldId id="281" r:id="rId20"/>
   </p:sldIdLst>
   <p:sldSz cx="12192000" cy="6858000"/>
   <p:notesSz cx="6858000" cy="9144000"/>
@@ -483,7 +486,7 @@
   <pc:docChgLst>
     <pc:chgData name="Chen, Jeff" userId="9a3224f5-9893-4468-acd0-6d03119f890b" providerId="ADAL" clId="{ADDFD314-117E-48B6-8E4A-FCE978035BAC}"/>
     <pc:docChg chg="undo custSel addSld delSld modSld sldOrd">
-      <pc:chgData name="Chen, Jeff" userId="9a3224f5-9893-4468-acd0-6d03119f890b" providerId="ADAL" clId="{ADDFD314-117E-48B6-8E4A-FCE978035BAC}" dt="2021-04-19T23:33:17.710" v="419" actId="2696"/>
+      <pc:chgData name="Chen, Jeff" userId="9a3224f5-9893-4468-acd0-6d03119f890b" providerId="ADAL" clId="{ADDFD314-117E-48B6-8E4A-FCE978035BAC}" dt="2021-04-21T20:38:03.319" v="532" actId="2696"/>
       <pc:docMkLst>
         <pc:docMk/>
       </pc:docMkLst>
@@ -1455,6 +1458,130 @@
           </ac:picMkLst>
         </pc:picChg>
       </pc:sldChg>
+      <pc:sldChg chg="addSp delSp new del mod">
+        <pc:chgData name="Chen, Jeff" userId="9a3224f5-9893-4468-acd0-6d03119f890b" providerId="ADAL" clId="{ADDFD314-117E-48B6-8E4A-FCE978035BAC}" dt="2021-04-21T20:38:03.319" v="532" actId="2696"/>
+        <pc:sldMkLst>
+          <pc:docMk/>
+          <pc:sldMk cId="804080076" sldId="278"/>
+        </pc:sldMkLst>
+        <pc:picChg chg="add del">
+          <ac:chgData name="Chen, Jeff" userId="9a3224f5-9893-4468-acd0-6d03119f890b" providerId="ADAL" clId="{ADDFD314-117E-48B6-8E4A-FCE978035BAC}" dt="2021-04-21T20:06:26.178" v="449" actId="478"/>
+          <ac:picMkLst>
+            <pc:docMk/>
+            <pc:sldMk cId="804080076" sldId="278"/>
+            <ac:picMk id="4" creationId="{EAB94048-6D40-4AD0-9D9D-D7FA16B21481}"/>
+          </ac:picMkLst>
+        </pc:picChg>
+        <pc:picChg chg="add del">
+          <ac:chgData name="Chen, Jeff" userId="9a3224f5-9893-4468-acd0-6d03119f890b" providerId="ADAL" clId="{ADDFD314-117E-48B6-8E4A-FCE978035BAC}" dt="2021-04-21T20:06:29.016" v="451" actId="22"/>
+          <ac:picMkLst>
+            <pc:docMk/>
+            <pc:sldMk cId="804080076" sldId="278"/>
+            <ac:picMk id="6" creationId="{35E15F70-6F41-47DE-939D-05A62AB97F81}"/>
+          </ac:picMkLst>
+        </pc:picChg>
+        <pc:picChg chg="add">
+          <ac:chgData name="Chen, Jeff" userId="9a3224f5-9893-4468-acd0-6d03119f890b" providerId="ADAL" clId="{ADDFD314-117E-48B6-8E4A-FCE978035BAC}" dt="2021-04-21T20:36:08.555" v="460" actId="22"/>
+          <ac:picMkLst>
+            <pc:docMk/>
+            <pc:sldMk cId="804080076" sldId="278"/>
+            <ac:picMk id="8" creationId="{BF4263BC-EE33-4D9A-9D14-FCCCA9994B5C}"/>
+          </ac:picMkLst>
+        </pc:picChg>
+      </pc:sldChg>
+      <pc:sldChg chg="addSp delSp modSp add mod">
+        <pc:chgData name="Chen, Jeff" userId="9a3224f5-9893-4468-acd0-6d03119f890b" providerId="ADAL" clId="{ADDFD314-117E-48B6-8E4A-FCE978035BAC}" dt="2021-04-21T18:54:28.946" v="448" actId="20577"/>
+        <pc:sldMkLst>
+          <pc:docMk/>
+          <pc:sldMk cId="2859807253" sldId="279"/>
+        </pc:sldMkLst>
+        <pc:spChg chg="mod">
+          <ac:chgData name="Chen, Jeff" userId="9a3224f5-9893-4468-acd0-6d03119f890b" providerId="ADAL" clId="{ADDFD314-117E-48B6-8E4A-FCE978035BAC}" dt="2021-04-21T18:54:28.946" v="448" actId="20577"/>
+          <ac:spMkLst>
+            <pc:docMk/>
+            <pc:sldMk cId="2859807253" sldId="279"/>
+            <ac:spMk id="2" creationId="{5D782BE0-68E6-427B-9207-7869060ED289}"/>
+          </ac:spMkLst>
+        </pc:spChg>
+        <pc:picChg chg="del">
+          <ac:chgData name="Chen, Jeff" userId="9a3224f5-9893-4468-acd0-6d03119f890b" providerId="ADAL" clId="{ADDFD314-117E-48B6-8E4A-FCE978035BAC}" dt="2021-04-21T18:54:13.861" v="423" actId="478"/>
+          <ac:picMkLst>
+            <pc:docMk/>
+            <pc:sldMk cId="2859807253" sldId="279"/>
+            <ac:picMk id="4" creationId="{209579BE-61A0-49C0-8836-85BCA1CE58ED}"/>
+          </ac:picMkLst>
+        </pc:picChg>
+        <pc:picChg chg="add mod">
+          <ac:chgData name="Chen, Jeff" userId="9a3224f5-9893-4468-acd0-6d03119f890b" providerId="ADAL" clId="{ADDFD314-117E-48B6-8E4A-FCE978035BAC}" dt="2021-04-21T18:54:21.671" v="425" actId="1076"/>
+          <ac:picMkLst>
+            <pc:docMk/>
+            <pc:sldMk cId="2859807253" sldId="279"/>
+            <ac:picMk id="5" creationId="{EFFA35B8-7426-4295-9F98-35ED465B0C24}"/>
+          </ac:picMkLst>
+        </pc:picChg>
+      </pc:sldChg>
+      <pc:sldChg chg="addSp delSp modSp add mod">
+        <pc:chgData name="Chen, Jeff" userId="9a3224f5-9893-4468-acd0-6d03119f890b" providerId="ADAL" clId="{ADDFD314-117E-48B6-8E4A-FCE978035BAC}" dt="2021-04-21T20:06:37.942" v="459" actId="20577"/>
+        <pc:sldMkLst>
+          <pc:docMk/>
+          <pc:sldMk cId="182257681" sldId="280"/>
+        </pc:sldMkLst>
+        <pc:spChg chg="mod">
+          <ac:chgData name="Chen, Jeff" userId="9a3224f5-9893-4468-acd0-6d03119f890b" providerId="ADAL" clId="{ADDFD314-117E-48B6-8E4A-FCE978035BAC}" dt="2021-04-21T20:06:37.942" v="459" actId="20577"/>
+          <ac:spMkLst>
+            <pc:docMk/>
+            <pc:sldMk cId="182257681" sldId="280"/>
+            <ac:spMk id="2" creationId="{5D782BE0-68E6-427B-9207-7869060ED289}"/>
+          </ac:spMkLst>
+        </pc:spChg>
+        <pc:picChg chg="add mod">
+          <ac:chgData name="Chen, Jeff" userId="9a3224f5-9893-4468-acd0-6d03119f890b" providerId="ADAL" clId="{ADDFD314-117E-48B6-8E4A-FCE978035BAC}" dt="2021-04-21T20:06:35.566" v="455" actId="1076"/>
+          <ac:picMkLst>
+            <pc:docMk/>
+            <pc:sldMk cId="182257681" sldId="280"/>
+            <ac:picMk id="4" creationId="{E7058138-5755-43B2-9371-95842B58911B}"/>
+          </ac:picMkLst>
+        </pc:picChg>
+        <pc:picChg chg="del">
+          <ac:chgData name="Chen, Jeff" userId="9a3224f5-9893-4468-acd0-6d03119f890b" providerId="ADAL" clId="{ADDFD314-117E-48B6-8E4A-FCE978035BAC}" dt="2021-04-21T20:06:33.143" v="453" actId="478"/>
+          <ac:picMkLst>
+            <pc:docMk/>
+            <pc:sldMk cId="182257681" sldId="280"/>
+            <ac:picMk id="5" creationId="{EFFA35B8-7426-4295-9F98-35ED465B0C24}"/>
+          </ac:picMkLst>
+        </pc:picChg>
+      </pc:sldChg>
+      <pc:sldChg chg="addSp delSp modSp add mod modNotesTx">
+        <pc:chgData name="Chen, Jeff" userId="9a3224f5-9893-4468-acd0-6d03119f890b" providerId="ADAL" clId="{ADDFD314-117E-48B6-8E4A-FCE978035BAC}" dt="2021-04-21T20:36:45.965" v="531" actId="20577"/>
+        <pc:sldMkLst>
+          <pc:docMk/>
+          <pc:sldMk cId="1810843605" sldId="281"/>
+        </pc:sldMkLst>
+        <pc:spChg chg="mod">
+          <ac:chgData name="Chen, Jeff" userId="9a3224f5-9893-4468-acd0-6d03119f890b" providerId="ADAL" clId="{ADDFD314-117E-48B6-8E4A-FCE978035BAC}" dt="2021-04-21T20:36:29.851" v="481" actId="20577"/>
+          <ac:spMkLst>
+            <pc:docMk/>
+            <pc:sldMk cId="1810843605" sldId="281"/>
+            <ac:spMk id="2" creationId="{5D782BE0-68E6-427B-9207-7869060ED289}"/>
+          </ac:spMkLst>
+        </pc:spChg>
+        <pc:picChg chg="del">
+          <ac:chgData name="Chen, Jeff" userId="9a3224f5-9893-4468-acd0-6d03119f890b" providerId="ADAL" clId="{ADDFD314-117E-48B6-8E4A-FCE978035BAC}" dt="2021-04-21T20:36:20.285" v="462" actId="478"/>
+          <ac:picMkLst>
+            <pc:docMk/>
+            <pc:sldMk cId="1810843605" sldId="281"/>
+            <ac:picMk id="4" creationId="{E7058138-5755-43B2-9371-95842B58911B}"/>
+          </ac:picMkLst>
+        </pc:picChg>
+        <pc:picChg chg="add mod">
+          <ac:chgData name="Chen, Jeff" userId="9a3224f5-9893-4468-acd0-6d03119f890b" providerId="ADAL" clId="{ADDFD314-117E-48B6-8E4A-FCE978035BAC}" dt="2021-04-21T20:36:24.019" v="464" actId="1076"/>
+          <ac:picMkLst>
+            <pc:docMk/>
+            <pc:sldMk cId="1810843605" sldId="281"/>
+            <ac:picMk id="5" creationId="{D017CD1E-4953-4EED-9B6C-DDED7DE66DB1}"/>
+          </ac:picMkLst>
+        </pc:picChg>
+      </pc:sldChg>
     </pc:docChg>
   </pc:docChgLst>
 </pc:chgInfo>
@@ -1542,7 +1669,7 @@
           <a:p>
             <a:fld id="{C00E58C0-CFD8-4D85-AD7C-5BD087C45905}" type="datetimeFigureOut">
               <a:rPr lang="en-US" smtClean="0"/>
-              <a:t>4/19/2021</a:t>
+              <a:t>4/21/2021</a:t>
             </a:fld>
             <a:endParaRPr lang="en-US"/>
           </a:p>
@@ -1809,6 +1936,93 @@
 </p:notesMaster>
 </file>
 
+<file path=ppt/notesSlides/notesSlide1.xml><?xml version="1.0" encoding="utf-8"?>
+<p:notes xmlns:a="http://schemas.openxmlformats.org/drawingml/2006/main" xmlns:r="http://schemas.openxmlformats.org/officeDocument/2006/relationships" xmlns:p="http://schemas.openxmlformats.org/presentationml/2006/main">
+  <p:cSld>
+    <p:spTree>
+      <p:nvGrpSpPr>
+        <p:cNvPr id="1" name=""/>
+        <p:cNvGrpSpPr/>
+        <p:nvPr/>
+      </p:nvGrpSpPr>
+      <p:grpSpPr>
+        <a:xfrm>
+          <a:off x="0" y="0"/>
+          <a:ext cx="0" cy="0"/>
+          <a:chOff x="0" y="0"/>
+          <a:chExt cx="0" cy="0"/>
+        </a:xfrm>
+      </p:grpSpPr>
+      <p:sp>
+        <p:nvSpPr>
+          <p:cNvPr id="2" name="Slide Image Placeholder 1"/>
+          <p:cNvSpPr>
+            <a:spLocks noGrp="1" noRot="1" noChangeAspect="1"/>
+          </p:cNvSpPr>
+          <p:nvPr>
+            <p:ph type="sldImg"/>
+          </p:nvPr>
+        </p:nvSpPr>
+        <p:spPr/>
+      </p:sp>
+      <p:sp>
+        <p:nvSpPr>
+          <p:cNvPr id="3" name="Notes Placeholder 2"/>
+          <p:cNvSpPr>
+            <a:spLocks noGrp="1"/>
+          </p:cNvSpPr>
+          <p:nvPr>
+            <p:ph type="body" idx="1"/>
+          </p:nvPr>
+        </p:nvSpPr>
+        <p:spPr/>
+        <p:txBody>
+          <a:bodyPr/>
+          <a:lstStyle/>
+          <a:p>
+            <a:r>
+              <a:rPr lang="en-US" dirty="0"/>
+              <a:t>Optional in Lectures but was on HW 21</a:t>
+            </a:r>
+          </a:p>
+        </p:txBody>
+      </p:sp>
+      <p:sp>
+        <p:nvSpPr>
+          <p:cNvPr id="4" name="Slide Number Placeholder 3"/>
+          <p:cNvSpPr>
+            <a:spLocks noGrp="1"/>
+          </p:cNvSpPr>
+          <p:nvPr>
+            <p:ph type="sldNum" sz="quarter" idx="5"/>
+          </p:nvPr>
+        </p:nvSpPr>
+        <p:spPr/>
+        <p:txBody>
+          <a:bodyPr/>
+          <a:lstStyle/>
+          <a:p>
+            <a:fld id="{0703A464-0E04-4D62-9C7A-917162937D0D}" type="slidenum">
+              <a:rPr lang="en-US" smtClean="0"/>
+              <a:t>19</a:t>
+            </a:fld>
+            <a:endParaRPr lang="en-US"/>
+          </a:p>
+        </p:txBody>
+      </p:sp>
+    </p:spTree>
+    <p:extLst>
+      <p:ext uri="{BB962C8B-B14F-4D97-AF65-F5344CB8AC3E}">
+        <p14:creationId xmlns:p14="http://schemas.microsoft.com/office/powerpoint/2010/main" val="539980365"/>
+      </p:ext>
+    </p:extLst>
+  </p:cSld>
+  <p:clrMapOvr>
+    <a:masterClrMapping/>
+  </p:clrMapOvr>
+</p:notes>
+</file>
+
 <file path=ppt/slideLayouts/slideLayout1.xml><?xml version="1.0" encoding="utf-8"?>
 <p:sldLayout xmlns:a="http://schemas.openxmlformats.org/drawingml/2006/main" xmlns:r="http://schemas.openxmlformats.org/officeDocument/2006/relationships" xmlns:p="http://schemas.openxmlformats.org/presentationml/2006/main" type="title" preserve="1">
   <p:cSld name="Title Slide">
@@ -1956,7 +2170,7 @@
           <a:p>
             <a:fld id="{D1A99228-55A4-4A98-A7C8-481D9DEBC883}" type="datetimeFigureOut">
               <a:rPr lang="en-US" smtClean="0"/>
-              <a:t>4/19/2021</a:t>
+              <a:t>4/21/2021</a:t>
             </a:fld>
             <a:endParaRPr lang="en-US"/>
           </a:p>
@@ -2154,7 +2368,7 @@
           <a:p>
             <a:fld id="{D1A99228-55A4-4A98-A7C8-481D9DEBC883}" type="datetimeFigureOut">
               <a:rPr lang="en-US" smtClean="0"/>
-              <a:t>4/19/2021</a:t>
+              <a:t>4/21/2021</a:t>
             </a:fld>
             <a:endParaRPr lang="en-US"/>
           </a:p>
@@ -2362,7 +2576,7 @@
           <a:p>
             <a:fld id="{D1A99228-55A4-4A98-A7C8-481D9DEBC883}" type="datetimeFigureOut">
               <a:rPr lang="en-US" smtClean="0"/>
-              <a:t>4/19/2021</a:t>
+              <a:t>4/21/2021</a:t>
             </a:fld>
             <a:endParaRPr lang="en-US"/>
           </a:p>
@@ -2560,7 +2774,7 @@
           <a:p>
             <a:fld id="{D1A99228-55A4-4A98-A7C8-481D9DEBC883}" type="datetimeFigureOut">
               <a:rPr lang="en-US" smtClean="0"/>
-              <a:t>4/19/2021</a:t>
+              <a:t>4/21/2021</a:t>
             </a:fld>
             <a:endParaRPr lang="en-US"/>
           </a:p>
@@ -2835,7 +3049,7 @@
           <a:p>
             <a:fld id="{D1A99228-55A4-4A98-A7C8-481D9DEBC883}" type="datetimeFigureOut">
               <a:rPr lang="en-US" smtClean="0"/>
-              <a:t>4/19/2021</a:t>
+              <a:t>4/21/2021</a:t>
             </a:fld>
             <a:endParaRPr lang="en-US"/>
           </a:p>
@@ -3100,7 +3314,7 @@
           <a:p>
             <a:fld id="{D1A99228-55A4-4A98-A7C8-481D9DEBC883}" type="datetimeFigureOut">
               <a:rPr lang="en-US" smtClean="0"/>
-              <a:t>4/19/2021</a:t>
+              <a:t>4/21/2021</a:t>
             </a:fld>
             <a:endParaRPr lang="en-US"/>
           </a:p>
@@ -3512,7 +3726,7 @@
           <a:p>
             <a:fld id="{D1A99228-55A4-4A98-A7C8-481D9DEBC883}" type="datetimeFigureOut">
               <a:rPr lang="en-US" smtClean="0"/>
-              <a:t>4/19/2021</a:t>
+              <a:t>4/21/2021</a:t>
             </a:fld>
             <a:endParaRPr lang="en-US"/>
           </a:p>
@@ -3653,7 +3867,7 @@
           <a:p>
             <a:fld id="{D1A99228-55A4-4A98-A7C8-481D9DEBC883}" type="datetimeFigureOut">
               <a:rPr lang="en-US" smtClean="0"/>
-              <a:t>4/19/2021</a:t>
+              <a:t>4/21/2021</a:t>
             </a:fld>
             <a:endParaRPr lang="en-US"/>
           </a:p>
@@ -3766,7 +3980,7 @@
           <a:p>
             <a:fld id="{D1A99228-55A4-4A98-A7C8-481D9DEBC883}" type="datetimeFigureOut">
               <a:rPr lang="en-US" smtClean="0"/>
-              <a:t>4/19/2021</a:t>
+              <a:t>4/21/2021</a:t>
             </a:fld>
             <a:endParaRPr lang="en-US"/>
           </a:p>
@@ -4077,7 +4291,7 @@
           <a:p>
             <a:fld id="{D1A99228-55A4-4A98-A7C8-481D9DEBC883}" type="datetimeFigureOut">
               <a:rPr lang="en-US" smtClean="0"/>
-              <a:t>4/19/2021</a:t>
+              <a:t>4/21/2021</a:t>
             </a:fld>
             <a:endParaRPr lang="en-US"/>
           </a:p>
@@ -4365,7 +4579,7 @@
           <a:p>
             <a:fld id="{D1A99228-55A4-4A98-A7C8-481D9DEBC883}" type="datetimeFigureOut">
               <a:rPr lang="en-US" smtClean="0"/>
-              <a:t>4/19/2021</a:t>
+              <a:t>4/21/2021</a:t>
             </a:fld>
             <a:endParaRPr lang="en-US"/>
           </a:p>
@@ -4606,7 +4820,7 @@
           <a:p>
             <a:fld id="{D1A99228-55A4-4A98-A7C8-481D9DEBC883}" type="datetimeFigureOut">
               <a:rPr lang="en-US" smtClean="0"/>
-              <a:t>4/19/2021</a:t>
+              <a:t>4/21/2021</a:t>
             </a:fld>
             <a:endParaRPr lang="en-US"/>
           </a:p>
@@ -10973,6 +11187,1923 @@
     <p:extLst>
       <p:ext uri="{BB962C8B-B14F-4D97-AF65-F5344CB8AC3E}">
         <p14:creationId xmlns:p14="http://schemas.microsoft.com/office/powerpoint/2010/main" val="284313729"/>
+      </p:ext>
+    </p:extLst>
+  </p:cSld>
+  <p:clrMapOvr>
+    <a:masterClrMapping/>
+  </p:clrMapOvr>
+</p:sld>
+</file>
+
+<file path=ppt/slides/slide17.xml><?xml version="1.0" encoding="utf-8"?>
+<p:sld xmlns:a="http://schemas.openxmlformats.org/drawingml/2006/main" xmlns:r="http://schemas.openxmlformats.org/officeDocument/2006/relationships" xmlns:p="http://schemas.openxmlformats.org/presentationml/2006/main">
+  <p:cSld>
+    <p:bg>
+      <p:bgPr>
+        <a:solidFill>
+          <a:schemeClr val="bg1"/>
+        </a:solidFill>
+        <a:effectLst/>
+      </p:bgPr>
+    </p:bg>
+    <p:spTree>
+      <p:nvGrpSpPr>
+        <p:cNvPr id="1" name=""/>
+        <p:cNvGrpSpPr/>
+        <p:nvPr/>
+      </p:nvGrpSpPr>
+      <p:grpSpPr>
+        <a:xfrm>
+          <a:off x="0" y="0"/>
+          <a:ext cx="0" cy="0"/>
+          <a:chOff x="0" y="0"/>
+          <a:chExt cx="0" cy="0"/>
+        </a:xfrm>
+      </p:grpSpPr>
+      <p:sp useBgFill="1">
+        <p:nvSpPr>
+          <p:cNvPr id="9" name="Rectangle 8">
+            <a:extLst>
+              <a:ext uri="{FF2B5EF4-FFF2-40B4-BE49-F238E27FC236}">
+                <a16:creationId xmlns:a16="http://schemas.microsoft.com/office/drawing/2014/main" id="{E30408B7-02B2-4EC4-8EE8-B53E74642A86}"/>
+              </a:ext>
+              <a:ext uri="{C183D7F6-B498-43B3-948B-1728B52AA6E4}">
+                <adec:decorative xmlns:adec="http://schemas.microsoft.com/office/drawing/2017/decorative" val="1"/>
+              </a:ext>
+            </a:extLst>
+          </p:cNvPr>
+          <p:cNvSpPr>
+            <a:spLocks noGrp="1" noRot="1" noChangeAspect="1" noMove="1" noResize="1" noEditPoints="1" noAdjustHandles="1" noChangeArrowheads="1" noChangeShapeType="1" noTextEdit="1"/>
+          </p:cNvSpPr>
+          <p:nvPr>
+            <p:extLst>
+              <p:ext uri="{386F3935-93C4-4BCD-93E2-E3B085C9AB24}">
+                <p16:designElem xmlns:p16="http://schemas.microsoft.com/office/powerpoint/2015/main" val="1"/>
+              </p:ext>
+            </p:extLst>
+          </p:nvPr>
+        </p:nvSpPr>
+        <p:spPr>
+          <a:xfrm>
+            <a:off x="0" y="0"/>
+            <a:ext cx="12192000" cy="6858000"/>
+          </a:xfrm>
+          <a:prstGeom prst="rect">
+            <a:avLst/>
+          </a:prstGeom>
+          <a:ln>
+            <a:noFill/>
+          </a:ln>
+        </p:spPr>
+        <p:style>
+          <a:lnRef idx="2">
+            <a:schemeClr val="accent1">
+              <a:shade val="50000"/>
+            </a:schemeClr>
+          </a:lnRef>
+          <a:fillRef idx="1">
+            <a:schemeClr val="accent1"/>
+          </a:fillRef>
+          <a:effectRef idx="0">
+            <a:schemeClr val="accent1"/>
+          </a:effectRef>
+          <a:fontRef idx="minor">
+            <a:schemeClr val="lt1"/>
+          </a:fontRef>
+        </p:style>
+        <p:txBody>
+          <a:bodyPr rtlCol="0" anchor="ctr"/>
+          <a:lstStyle/>
+          <a:p>
+            <a:pPr algn="ctr"/>
+            <a:endParaRPr lang="en-US"/>
+          </a:p>
+        </p:txBody>
+      </p:sp>
+      <p:sp>
+        <p:nvSpPr>
+          <p:cNvPr id="11" name="Rectangle 10">
+            <a:extLst>
+              <a:ext uri="{FF2B5EF4-FFF2-40B4-BE49-F238E27FC236}">
+                <a16:creationId xmlns:a16="http://schemas.microsoft.com/office/drawing/2014/main" id="{FC117A00-E1E3-4C50-9444-14FB2BC778DD}"/>
+              </a:ext>
+              <a:ext uri="{C183D7F6-B498-43B3-948B-1728B52AA6E4}">
+                <adec:decorative xmlns:adec="http://schemas.microsoft.com/office/drawing/2017/decorative" val="1"/>
+              </a:ext>
+            </a:extLst>
+          </p:cNvPr>
+          <p:cNvSpPr>
+            <a:spLocks noGrp="1" noRot="1" noChangeAspect="1" noMove="1" noResize="1" noEditPoints="1" noAdjustHandles="1" noChangeArrowheads="1" noChangeShapeType="1" noTextEdit="1"/>
+          </p:cNvSpPr>
+          <p:nvPr>
+            <p:extLst>
+              <p:ext uri="{386F3935-93C4-4BCD-93E2-E3B085C9AB24}">
+                <p16:designElem xmlns:p16="http://schemas.microsoft.com/office/powerpoint/2015/main" val="1"/>
+              </p:ext>
+            </p:extLst>
+          </p:nvPr>
+        </p:nvSpPr>
+        <p:spPr>
+          <a:xfrm>
+            <a:off x="1" y="4233674"/>
+            <a:ext cx="12192000" cy="2624326"/>
+          </a:xfrm>
+          <a:prstGeom prst="rect">
+            <a:avLst/>
+          </a:prstGeom>
+          <a:solidFill>
+            <a:schemeClr val="tx1"/>
+          </a:solidFill>
+          <a:ln>
+            <a:noFill/>
+          </a:ln>
+        </p:spPr>
+        <p:style>
+          <a:lnRef idx="2">
+            <a:schemeClr val="accent1">
+              <a:shade val="50000"/>
+            </a:schemeClr>
+          </a:lnRef>
+          <a:fillRef idx="1">
+            <a:schemeClr val="accent1"/>
+          </a:fillRef>
+          <a:effectRef idx="0">
+            <a:schemeClr val="accent1"/>
+          </a:effectRef>
+          <a:fontRef idx="minor">
+            <a:schemeClr val="lt1"/>
+          </a:fontRef>
+        </p:style>
+        <p:txBody>
+          <a:bodyPr rtlCol="0" anchor="ctr"/>
+          <a:lstStyle/>
+          <a:p>
+            <a:pPr algn="ctr"/>
+            <a:endParaRPr lang="en-US"/>
+          </a:p>
+        </p:txBody>
+      </p:sp>
+      <p:sp>
+        <p:nvSpPr>
+          <p:cNvPr id="2" name="Title 1">
+            <a:extLst>
+              <a:ext uri="{FF2B5EF4-FFF2-40B4-BE49-F238E27FC236}">
+                <a16:creationId xmlns:a16="http://schemas.microsoft.com/office/drawing/2014/main" id="{5D782BE0-68E6-427B-9207-7869060ED289}"/>
+              </a:ext>
+            </a:extLst>
+          </p:cNvPr>
+          <p:cNvSpPr>
+            <a:spLocks noGrp="1"/>
+          </p:cNvSpPr>
+          <p:nvPr>
+            <p:ph type="title"/>
+          </p:nvPr>
+        </p:nvSpPr>
+        <p:spPr>
+          <a:xfrm>
+            <a:off x="965200" y="4428318"/>
+            <a:ext cx="8508512" cy="1274076"/>
+          </a:xfrm>
+        </p:spPr>
+        <p:txBody>
+          <a:bodyPr vert="horz" lIns="91440" tIns="45720" rIns="91440" bIns="45720" rtlCol="0" anchor="b">
+            <a:normAutofit/>
+          </a:bodyPr>
+          <a:lstStyle/>
+          <a:p>
+            <a:r>
+              <a:rPr lang="en-US" sz="6000" kern="1200" dirty="0">
+                <a:solidFill>
+                  <a:schemeClr val="bg1"/>
+                </a:solidFill>
+                <a:latin typeface="+mj-lt"/>
+                <a:ea typeface="+mj-ea"/>
+                <a:cs typeface="+mj-cs"/>
+              </a:rPr>
+              <a:t>Least Squares Solution</a:t>
+            </a:r>
+          </a:p>
+        </p:txBody>
+      </p:sp>
+      <p:grpSp>
+        <p:nvGrpSpPr>
+          <p:cNvPr id="13" name="Group 12">
+            <a:extLst>
+              <a:ext uri="{FF2B5EF4-FFF2-40B4-BE49-F238E27FC236}">
+                <a16:creationId xmlns:a16="http://schemas.microsoft.com/office/drawing/2014/main" id="{3CA30F3A-949D-4014-A5BD-809F81E84132}"/>
+              </a:ext>
+              <a:ext uri="{C183D7F6-B498-43B3-948B-1728B52AA6E4}">
+                <adec:decorative xmlns:adec="http://schemas.microsoft.com/office/drawing/2017/decorative" val="1"/>
+              </a:ext>
+            </a:extLst>
+          </p:cNvPr>
+          <p:cNvGrpSpPr>
+            <a:grpSpLocks noGrp="1" noUngrp="1" noRot="1" noChangeAspect="1" noMove="1" noResize="1"/>
+          </p:cNvGrpSpPr>
+          <p:nvPr>
+            <p:extLst>
+              <p:ext uri="{386F3935-93C4-4BCD-93E2-E3B085C9AB24}">
+                <p16:designElem xmlns:p16="http://schemas.microsoft.com/office/powerpoint/2015/main" val="1"/>
+              </p:ext>
+            </p:extLst>
+          </p:nvPr>
+        </p:nvGrpSpPr>
+        <p:grpSpPr>
+          <a:xfrm>
+            <a:off x="10208171" y="4641753"/>
+            <a:ext cx="1128382" cy="847206"/>
+            <a:chOff x="8183879" y="1000124"/>
+            <a:chExt cx="1562267" cy="1172973"/>
+          </a:xfrm>
+        </p:grpSpPr>
+        <p:sp>
+          <p:nvSpPr>
+            <p:cNvPr id="14" name="Freeform 5">
+              <a:extLst>
+                <a:ext uri="{FF2B5EF4-FFF2-40B4-BE49-F238E27FC236}">
+                  <a16:creationId xmlns:a16="http://schemas.microsoft.com/office/drawing/2014/main" id="{A486C148-F247-4847-8096-6992A8A977A0}"/>
+                </a:ext>
+                <a:ext uri="{C183D7F6-B498-43B3-948B-1728B52AA6E4}">
+                  <adec:decorative xmlns:adec="http://schemas.microsoft.com/office/drawing/2017/decorative" val="1"/>
+                </a:ext>
+              </a:extLst>
+            </p:cNvPr>
+            <p:cNvSpPr>
+              <a:spLocks/>
+            </p:cNvSpPr>
+            <p:nvPr>
+              <p:extLst>
+                <p:ext uri="{386F3935-93C4-4BCD-93E2-E3B085C9AB24}">
+                  <p16:designElem xmlns:p16="http://schemas.microsoft.com/office/powerpoint/2015/main" val="1"/>
+                </p:ext>
+              </p:extLst>
+            </p:nvPr>
+          </p:nvSpPr>
+          <p:spPr bwMode="auto">
+            <a:xfrm>
+              <a:off x="8183879" y="1348782"/>
+              <a:ext cx="935037" cy="824315"/>
+            </a:xfrm>
+            <a:custGeom>
+              <a:avLst/>
+              <a:gdLst>
+                <a:gd name="T0" fmla="*/ 225 w 785"/>
+                <a:gd name="T1" fmla="*/ 692 h 692"/>
+                <a:gd name="T2" fmla="*/ 177 w 785"/>
+                <a:gd name="T3" fmla="*/ 665 h 692"/>
+                <a:gd name="T4" fmla="*/ 9 w 785"/>
+                <a:gd name="T5" fmla="*/ 374 h 692"/>
+                <a:gd name="T6" fmla="*/ 9 w 785"/>
+                <a:gd name="T7" fmla="*/ 318 h 692"/>
+                <a:gd name="T8" fmla="*/ 177 w 785"/>
+                <a:gd name="T9" fmla="*/ 27 h 692"/>
+                <a:gd name="T10" fmla="*/ 225 w 785"/>
+                <a:gd name="T11" fmla="*/ 0 h 692"/>
+                <a:gd name="T12" fmla="*/ 561 w 785"/>
+                <a:gd name="T13" fmla="*/ 0 h 692"/>
+                <a:gd name="T14" fmla="*/ 609 w 785"/>
+                <a:gd name="T15" fmla="*/ 27 h 692"/>
+                <a:gd name="T16" fmla="*/ 777 w 785"/>
+                <a:gd name="T17" fmla="*/ 318 h 692"/>
+                <a:gd name="T18" fmla="*/ 777 w 785"/>
+                <a:gd name="T19" fmla="*/ 374 h 692"/>
+                <a:gd name="T20" fmla="*/ 609 w 785"/>
+                <a:gd name="T21" fmla="*/ 665 h 692"/>
+                <a:gd name="T22" fmla="*/ 561 w 785"/>
+                <a:gd name="T23" fmla="*/ 692 h 692"/>
+                <a:gd name="T24" fmla="*/ 225 w 785"/>
+                <a:gd name="T25" fmla="*/ 692 h 692"/>
+              </a:gdLst>
+              <a:ahLst/>
+              <a:cxnLst>
+                <a:cxn ang="0">
+                  <a:pos x="T0" y="T1"/>
+                </a:cxn>
+                <a:cxn ang="0">
+                  <a:pos x="T2" y="T3"/>
+                </a:cxn>
+                <a:cxn ang="0">
+                  <a:pos x="T4" y="T5"/>
+                </a:cxn>
+                <a:cxn ang="0">
+                  <a:pos x="T6" y="T7"/>
+                </a:cxn>
+                <a:cxn ang="0">
+                  <a:pos x="T8" y="T9"/>
+                </a:cxn>
+                <a:cxn ang="0">
+                  <a:pos x="T10" y="T11"/>
+                </a:cxn>
+                <a:cxn ang="0">
+                  <a:pos x="T12" y="T13"/>
+                </a:cxn>
+                <a:cxn ang="0">
+                  <a:pos x="T14" y="T15"/>
+                </a:cxn>
+                <a:cxn ang="0">
+                  <a:pos x="T16" y="T17"/>
+                </a:cxn>
+                <a:cxn ang="0">
+                  <a:pos x="T18" y="T19"/>
+                </a:cxn>
+                <a:cxn ang="0">
+                  <a:pos x="T20" y="T21"/>
+                </a:cxn>
+                <a:cxn ang="0">
+                  <a:pos x="T22" y="T23"/>
+                </a:cxn>
+                <a:cxn ang="0">
+                  <a:pos x="T24" y="T25"/>
+                </a:cxn>
+              </a:cxnLst>
+              <a:rect l="0" t="0" r="r" b="b"/>
+              <a:pathLst>
+                <a:path w="785" h="692">
+                  <a:moveTo>
+                    <a:pt x="225" y="692"/>
+                  </a:moveTo>
+                  <a:cubicBezTo>
+                    <a:pt x="207" y="692"/>
+                    <a:pt x="185" y="680"/>
+                    <a:pt x="177" y="665"/>
+                  </a:cubicBezTo>
+                  <a:cubicBezTo>
+                    <a:pt x="9" y="374"/>
+                    <a:pt x="9" y="374"/>
+                    <a:pt x="9" y="374"/>
+                  </a:cubicBezTo>
+                  <a:cubicBezTo>
+                    <a:pt x="0" y="358"/>
+                    <a:pt x="0" y="334"/>
+                    <a:pt x="9" y="318"/>
+                  </a:cubicBezTo>
+                  <a:cubicBezTo>
+                    <a:pt x="177" y="27"/>
+                    <a:pt x="177" y="27"/>
+                    <a:pt x="177" y="27"/>
+                  </a:cubicBezTo>
+                  <a:cubicBezTo>
+                    <a:pt x="185" y="12"/>
+                    <a:pt x="207" y="0"/>
+                    <a:pt x="225" y="0"/>
+                  </a:cubicBezTo>
+                  <a:cubicBezTo>
+                    <a:pt x="561" y="0"/>
+                    <a:pt x="561" y="0"/>
+                    <a:pt x="561" y="0"/>
+                  </a:cubicBezTo>
+                  <a:cubicBezTo>
+                    <a:pt x="578" y="0"/>
+                    <a:pt x="600" y="12"/>
+                    <a:pt x="609" y="27"/>
+                  </a:cubicBezTo>
+                  <a:cubicBezTo>
+                    <a:pt x="777" y="318"/>
+                    <a:pt x="777" y="318"/>
+                    <a:pt x="777" y="318"/>
+                  </a:cubicBezTo>
+                  <a:cubicBezTo>
+                    <a:pt x="785" y="334"/>
+                    <a:pt x="785" y="358"/>
+                    <a:pt x="777" y="374"/>
+                  </a:cubicBezTo>
+                  <a:cubicBezTo>
+                    <a:pt x="609" y="665"/>
+                    <a:pt x="609" y="665"/>
+                    <a:pt x="609" y="665"/>
+                  </a:cubicBezTo>
+                  <a:cubicBezTo>
+                    <a:pt x="600" y="680"/>
+                    <a:pt x="578" y="692"/>
+                    <a:pt x="561" y="692"/>
+                  </a:cubicBezTo>
+                  <a:lnTo>
+                    <a:pt x="225" y="692"/>
+                  </a:lnTo>
+                  <a:close/>
+                </a:path>
+              </a:pathLst>
+            </a:custGeom>
+            <a:noFill/>
+            <a:ln w="28575" cmpd="sng">
+              <a:solidFill>
+                <a:schemeClr val="bg1"/>
+              </a:solidFill>
+            </a:ln>
+          </p:spPr>
+          <p:txBody>
+            <a:bodyPr vert="horz" wrap="square" lIns="91440" tIns="45720" rIns="91440" bIns="45720" numCol="1" anchor="t" anchorCtr="0" compatLnSpc="1">
+              <a:prstTxWarp prst="textNoShape">
+                <a:avLst/>
+              </a:prstTxWarp>
+            </a:bodyPr>
+            <a:lstStyle/>
+            <a:p>
+              <a:endParaRPr lang="en-US"/>
+            </a:p>
+          </p:txBody>
+        </p:sp>
+        <p:sp>
+          <p:nvSpPr>
+            <p:cNvPr id="15" name="Freeform 5">
+              <a:extLst>
+                <a:ext uri="{FF2B5EF4-FFF2-40B4-BE49-F238E27FC236}">
+                  <a16:creationId xmlns:a16="http://schemas.microsoft.com/office/drawing/2014/main" id="{F05C5920-B89E-417C-9583-B3DC913ADD78}"/>
+                </a:ext>
+                <a:ext uri="{C183D7F6-B498-43B3-948B-1728B52AA6E4}">
+                  <adec:decorative xmlns:adec="http://schemas.microsoft.com/office/drawing/2017/decorative" val="1"/>
+                </a:ext>
+              </a:extLst>
+            </p:cNvPr>
+            <p:cNvSpPr>
+              <a:spLocks/>
+            </p:cNvSpPr>
+            <p:nvPr>
+              <p:extLst>
+                <p:ext uri="{386F3935-93C4-4BCD-93E2-E3B085C9AB24}">
+                  <p16:designElem xmlns:p16="http://schemas.microsoft.com/office/powerpoint/2015/main" val="1"/>
+                </p:ext>
+              </p:extLst>
+            </p:nvPr>
+          </p:nvSpPr>
+          <p:spPr bwMode="auto">
+            <a:xfrm>
+              <a:off x="8983979" y="1000124"/>
+              <a:ext cx="762167" cy="671915"/>
+            </a:xfrm>
+            <a:custGeom>
+              <a:avLst/>
+              <a:gdLst>
+                <a:gd name="T0" fmla="*/ 225 w 785"/>
+                <a:gd name="T1" fmla="*/ 692 h 692"/>
+                <a:gd name="T2" fmla="*/ 177 w 785"/>
+                <a:gd name="T3" fmla="*/ 665 h 692"/>
+                <a:gd name="T4" fmla="*/ 9 w 785"/>
+                <a:gd name="T5" fmla="*/ 374 h 692"/>
+                <a:gd name="T6" fmla="*/ 9 w 785"/>
+                <a:gd name="T7" fmla="*/ 318 h 692"/>
+                <a:gd name="T8" fmla="*/ 177 w 785"/>
+                <a:gd name="T9" fmla="*/ 27 h 692"/>
+                <a:gd name="T10" fmla="*/ 225 w 785"/>
+                <a:gd name="T11" fmla="*/ 0 h 692"/>
+                <a:gd name="T12" fmla="*/ 561 w 785"/>
+                <a:gd name="T13" fmla="*/ 0 h 692"/>
+                <a:gd name="T14" fmla="*/ 609 w 785"/>
+                <a:gd name="T15" fmla="*/ 27 h 692"/>
+                <a:gd name="T16" fmla="*/ 777 w 785"/>
+                <a:gd name="T17" fmla="*/ 318 h 692"/>
+                <a:gd name="T18" fmla="*/ 777 w 785"/>
+                <a:gd name="T19" fmla="*/ 374 h 692"/>
+                <a:gd name="T20" fmla="*/ 609 w 785"/>
+                <a:gd name="T21" fmla="*/ 665 h 692"/>
+                <a:gd name="T22" fmla="*/ 561 w 785"/>
+                <a:gd name="T23" fmla="*/ 692 h 692"/>
+                <a:gd name="T24" fmla="*/ 225 w 785"/>
+                <a:gd name="T25" fmla="*/ 692 h 692"/>
+              </a:gdLst>
+              <a:ahLst/>
+              <a:cxnLst>
+                <a:cxn ang="0">
+                  <a:pos x="T0" y="T1"/>
+                </a:cxn>
+                <a:cxn ang="0">
+                  <a:pos x="T2" y="T3"/>
+                </a:cxn>
+                <a:cxn ang="0">
+                  <a:pos x="T4" y="T5"/>
+                </a:cxn>
+                <a:cxn ang="0">
+                  <a:pos x="T6" y="T7"/>
+                </a:cxn>
+                <a:cxn ang="0">
+                  <a:pos x="T8" y="T9"/>
+                </a:cxn>
+                <a:cxn ang="0">
+                  <a:pos x="T10" y="T11"/>
+                </a:cxn>
+                <a:cxn ang="0">
+                  <a:pos x="T12" y="T13"/>
+                </a:cxn>
+                <a:cxn ang="0">
+                  <a:pos x="T14" y="T15"/>
+                </a:cxn>
+                <a:cxn ang="0">
+                  <a:pos x="T16" y="T17"/>
+                </a:cxn>
+                <a:cxn ang="0">
+                  <a:pos x="T18" y="T19"/>
+                </a:cxn>
+                <a:cxn ang="0">
+                  <a:pos x="T20" y="T21"/>
+                </a:cxn>
+                <a:cxn ang="0">
+                  <a:pos x="T22" y="T23"/>
+                </a:cxn>
+                <a:cxn ang="0">
+                  <a:pos x="T24" y="T25"/>
+                </a:cxn>
+              </a:cxnLst>
+              <a:rect l="0" t="0" r="r" b="b"/>
+              <a:pathLst>
+                <a:path w="785" h="692">
+                  <a:moveTo>
+                    <a:pt x="225" y="692"/>
+                  </a:moveTo>
+                  <a:cubicBezTo>
+                    <a:pt x="207" y="692"/>
+                    <a:pt x="185" y="680"/>
+                    <a:pt x="177" y="665"/>
+                  </a:cubicBezTo>
+                  <a:cubicBezTo>
+                    <a:pt x="9" y="374"/>
+                    <a:pt x="9" y="374"/>
+                    <a:pt x="9" y="374"/>
+                  </a:cubicBezTo>
+                  <a:cubicBezTo>
+                    <a:pt x="0" y="358"/>
+                    <a:pt x="0" y="334"/>
+                    <a:pt x="9" y="318"/>
+                  </a:cubicBezTo>
+                  <a:cubicBezTo>
+                    <a:pt x="177" y="27"/>
+                    <a:pt x="177" y="27"/>
+                    <a:pt x="177" y="27"/>
+                  </a:cubicBezTo>
+                  <a:cubicBezTo>
+                    <a:pt x="185" y="12"/>
+                    <a:pt x="207" y="0"/>
+                    <a:pt x="225" y="0"/>
+                  </a:cubicBezTo>
+                  <a:cubicBezTo>
+                    <a:pt x="561" y="0"/>
+                    <a:pt x="561" y="0"/>
+                    <a:pt x="561" y="0"/>
+                  </a:cubicBezTo>
+                  <a:cubicBezTo>
+                    <a:pt x="578" y="0"/>
+                    <a:pt x="600" y="12"/>
+                    <a:pt x="609" y="27"/>
+                  </a:cubicBezTo>
+                  <a:cubicBezTo>
+                    <a:pt x="777" y="318"/>
+                    <a:pt x="777" y="318"/>
+                    <a:pt x="777" y="318"/>
+                  </a:cubicBezTo>
+                  <a:cubicBezTo>
+                    <a:pt x="785" y="334"/>
+                    <a:pt x="785" y="358"/>
+                    <a:pt x="777" y="374"/>
+                  </a:cubicBezTo>
+                  <a:cubicBezTo>
+                    <a:pt x="609" y="665"/>
+                    <a:pt x="609" y="665"/>
+                    <a:pt x="609" y="665"/>
+                  </a:cubicBezTo>
+                  <a:cubicBezTo>
+                    <a:pt x="600" y="680"/>
+                    <a:pt x="578" y="692"/>
+                    <a:pt x="561" y="692"/>
+                  </a:cubicBezTo>
+                  <a:lnTo>
+                    <a:pt x="225" y="692"/>
+                  </a:lnTo>
+                  <a:close/>
+                </a:path>
+              </a:pathLst>
+            </a:custGeom>
+            <a:noFill/>
+            <a:ln w="28575" cmpd="sng">
+              <a:solidFill>
+                <a:schemeClr val="bg1"/>
+              </a:solidFill>
+            </a:ln>
+          </p:spPr>
+          <p:txBody>
+            <a:bodyPr vert="horz" wrap="square" lIns="91440" tIns="45720" rIns="91440" bIns="45720" numCol="1" anchor="t" anchorCtr="0" compatLnSpc="1">
+              <a:prstTxWarp prst="textNoShape">
+                <a:avLst/>
+              </a:prstTxWarp>
+            </a:bodyPr>
+            <a:lstStyle/>
+            <a:p>
+              <a:endParaRPr lang="en-US"/>
+            </a:p>
+          </p:txBody>
+        </p:sp>
+      </p:grpSp>
+      <p:pic>
+        <p:nvPicPr>
+          <p:cNvPr id="5" name="Picture 4">
+            <a:extLst>
+              <a:ext uri="{FF2B5EF4-FFF2-40B4-BE49-F238E27FC236}">
+                <a16:creationId xmlns:a16="http://schemas.microsoft.com/office/drawing/2014/main" id="{EFFA35B8-7426-4295-9F98-35ED465B0C24}"/>
+              </a:ext>
+            </a:extLst>
+          </p:cNvPr>
+          <p:cNvPicPr>
+            <a:picLocks noChangeAspect="1"/>
+          </p:cNvPicPr>
+          <p:nvPr/>
+        </p:nvPicPr>
+        <p:blipFill>
+          <a:blip r:embed="rId2"/>
+          <a:stretch>
+            <a:fillRect/>
+          </a:stretch>
+        </p:blipFill>
+        <p:spPr>
+          <a:xfrm>
+            <a:off x="1697253" y="1444028"/>
+            <a:ext cx="9639300" cy="2047875"/>
+          </a:xfrm>
+          <a:prstGeom prst="rect">
+            <a:avLst/>
+          </a:prstGeom>
+        </p:spPr>
+      </p:pic>
+    </p:spTree>
+    <p:extLst>
+      <p:ext uri="{BB962C8B-B14F-4D97-AF65-F5344CB8AC3E}">
+        <p14:creationId xmlns:p14="http://schemas.microsoft.com/office/powerpoint/2010/main" val="2859807253"/>
+      </p:ext>
+    </p:extLst>
+  </p:cSld>
+  <p:clrMapOvr>
+    <a:masterClrMapping/>
+  </p:clrMapOvr>
+</p:sld>
+</file>
+
+<file path=ppt/slides/slide18.xml><?xml version="1.0" encoding="utf-8"?>
+<p:sld xmlns:a="http://schemas.openxmlformats.org/drawingml/2006/main" xmlns:r="http://schemas.openxmlformats.org/officeDocument/2006/relationships" xmlns:p="http://schemas.openxmlformats.org/presentationml/2006/main">
+  <p:cSld>
+    <p:bg>
+      <p:bgPr>
+        <a:solidFill>
+          <a:schemeClr val="bg1"/>
+        </a:solidFill>
+        <a:effectLst/>
+      </p:bgPr>
+    </p:bg>
+    <p:spTree>
+      <p:nvGrpSpPr>
+        <p:cNvPr id="1" name=""/>
+        <p:cNvGrpSpPr/>
+        <p:nvPr/>
+      </p:nvGrpSpPr>
+      <p:grpSpPr>
+        <a:xfrm>
+          <a:off x="0" y="0"/>
+          <a:ext cx="0" cy="0"/>
+          <a:chOff x="0" y="0"/>
+          <a:chExt cx="0" cy="0"/>
+        </a:xfrm>
+      </p:grpSpPr>
+      <p:sp useBgFill="1">
+        <p:nvSpPr>
+          <p:cNvPr id="9" name="Rectangle 8">
+            <a:extLst>
+              <a:ext uri="{FF2B5EF4-FFF2-40B4-BE49-F238E27FC236}">
+                <a16:creationId xmlns:a16="http://schemas.microsoft.com/office/drawing/2014/main" id="{E30408B7-02B2-4EC4-8EE8-B53E74642A86}"/>
+              </a:ext>
+              <a:ext uri="{C183D7F6-B498-43B3-948B-1728B52AA6E4}">
+                <adec:decorative xmlns:adec="http://schemas.microsoft.com/office/drawing/2017/decorative" val="1"/>
+              </a:ext>
+            </a:extLst>
+          </p:cNvPr>
+          <p:cNvSpPr>
+            <a:spLocks noGrp="1" noRot="1" noChangeAspect="1" noMove="1" noResize="1" noEditPoints="1" noAdjustHandles="1" noChangeArrowheads="1" noChangeShapeType="1" noTextEdit="1"/>
+          </p:cNvSpPr>
+          <p:nvPr>
+            <p:extLst>
+              <p:ext uri="{386F3935-93C4-4BCD-93E2-E3B085C9AB24}">
+                <p16:designElem xmlns:p16="http://schemas.microsoft.com/office/powerpoint/2015/main" val="1"/>
+              </p:ext>
+            </p:extLst>
+          </p:nvPr>
+        </p:nvSpPr>
+        <p:spPr>
+          <a:xfrm>
+            <a:off x="0" y="0"/>
+            <a:ext cx="12192000" cy="6858000"/>
+          </a:xfrm>
+          <a:prstGeom prst="rect">
+            <a:avLst/>
+          </a:prstGeom>
+          <a:ln>
+            <a:noFill/>
+          </a:ln>
+        </p:spPr>
+        <p:style>
+          <a:lnRef idx="2">
+            <a:schemeClr val="accent1">
+              <a:shade val="50000"/>
+            </a:schemeClr>
+          </a:lnRef>
+          <a:fillRef idx="1">
+            <a:schemeClr val="accent1"/>
+          </a:fillRef>
+          <a:effectRef idx="0">
+            <a:schemeClr val="accent1"/>
+          </a:effectRef>
+          <a:fontRef idx="minor">
+            <a:schemeClr val="lt1"/>
+          </a:fontRef>
+        </p:style>
+        <p:txBody>
+          <a:bodyPr rtlCol="0" anchor="ctr"/>
+          <a:lstStyle/>
+          <a:p>
+            <a:pPr algn="ctr"/>
+            <a:endParaRPr lang="en-US"/>
+          </a:p>
+        </p:txBody>
+      </p:sp>
+      <p:sp>
+        <p:nvSpPr>
+          <p:cNvPr id="11" name="Rectangle 10">
+            <a:extLst>
+              <a:ext uri="{FF2B5EF4-FFF2-40B4-BE49-F238E27FC236}">
+                <a16:creationId xmlns:a16="http://schemas.microsoft.com/office/drawing/2014/main" id="{FC117A00-E1E3-4C50-9444-14FB2BC778DD}"/>
+              </a:ext>
+              <a:ext uri="{C183D7F6-B498-43B3-948B-1728B52AA6E4}">
+                <adec:decorative xmlns:adec="http://schemas.microsoft.com/office/drawing/2017/decorative" val="1"/>
+              </a:ext>
+            </a:extLst>
+          </p:cNvPr>
+          <p:cNvSpPr>
+            <a:spLocks noGrp="1" noRot="1" noChangeAspect="1" noMove="1" noResize="1" noEditPoints="1" noAdjustHandles="1" noChangeArrowheads="1" noChangeShapeType="1" noTextEdit="1"/>
+          </p:cNvSpPr>
+          <p:nvPr>
+            <p:extLst>
+              <p:ext uri="{386F3935-93C4-4BCD-93E2-E3B085C9AB24}">
+                <p16:designElem xmlns:p16="http://schemas.microsoft.com/office/powerpoint/2015/main" val="1"/>
+              </p:ext>
+            </p:extLst>
+          </p:nvPr>
+        </p:nvSpPr>
+        <p:spPr>
+          <a:xfrm>
+            <a:off x="1" y="4233674"/>
+            <a:ext cx="12192000" cy="2624326"/>
+          </a:xfrm>
+          <a:prstGeom prst="rect">
+            <a:avLst/>
+          </a:prstGeom>
+          <a:solidFill>
+            <a:schemeClr val="tx1"/>
+          </a:solidFill>
+          <a:ln>
+            <a:noFill/>
+          </a:ln>
+        </p:spPr>
+        <p:style>
+          <a:lnRef idx="2">
+            <a:schemeClr val="accent1">
+              <a:shade val="50000"/>
+            </a:schemeClr>
+          </a:lnRef>
+          <a:fillRef idx="1">
+            <a:schemeClr val="accent1"/>
+          </a:fillRef>
+          <a:effectRef idx="0">
+            <a:schemeClr val="accent1"/>
+          </a:effectRef>
+          <a:fontRef idx="minor">
+            <a:schemeClr val="lt1"/>
+          </a:fontRef>
+        </p:style>
+        <p:txBody>
+          <a:bodyPr rtlCol="0" anchor="ctr"/>
+          <a:lstStyle/>
+          <a:p>
+            <a:pPr algn="ctr"/>
+            <a:endParaRPr lang="en-US"/>
+          </a:p>
+        </p:txBody>
+      </p:sp>
+      <p:sp>
+        <p:nvSpPr>
+          <p:cNvPr id="2" name="Title 1">
+            <a:extLst>
+              <a:ext uri="{FF2B5EF4-FFF2-40B4-BE49-F238E27FC236}">
+                <a16:creationId xmlns:a16="http://schemas.microsoft.com/office/drawing/2014/main" id="{5D782BE0-68E6-427B-9207-7869060ED289}"/>
+              </a:ext>
+            </a:extLst>
+          </p:cNvPr>
+          <p:cNvSpPr>
+            <a:spLocks noGrp="1"/>
+          </p:cNvSpPr>
+          <p:nvPr>
+            <p:ph type="title"/>
+          </p:nvPr>
+        </p:nvSpPr>
+        <p:spPr>
+          <a:xfrm>
+            <a:off x="965200" y="4428318"/>
+            <a:ext cx="8508512" cy="1274076"/>
+          </a:xfrm>
+        </p:spPr>
+        <p:txBody>
+          <a:bodyPr vert="horz" lIns="91440" tIns="45720" rIns="91440" bIns="45720" rtlCol="0" anchor="b">
+            <a:normAutofit/>
+          </a:bodyPr>
+          <a:lstStyle/>
+          <a:p>
+            <a:r>
+              <a:rPr lang="en-US" sz="6000" kern="1200" dirty="0">
+                <a:solidFill>
+                  <a:schemeClr val="bg1"/>
+                </a:solidFill>
+                <a:latin typeface="+mj-lt"/>
+                <a:ea typeface="+mj-ea"/>
+                <a:cs typeface="+mj-cs"/>
+              </a:rPr>
+              <a:t>Least Squares Line</a:t>
+            </a:r>
+          </a:p>
+        </p:txBody>
+      </p:sp>
+      <p:grpSp>
+        <p:nvGrpSpPr>
+          <p:cNvPr id="13" name="Group 12">
+            <a:extLst>
+              <a:ext uri="{FF2B5EF4-FFF2-40B4-BE49-F238E27FC236}">
+                <a16:creationId xmlns:a16="http://schemas.microsoft.com/office/drawing/2014/main" id="{3CA30F3A-949D-4014-A5BD-809F81E84132}"/>
+              </a:ext>
+              <a:ext uri="{C183D7F6-B498-43B3-948B-1728B52AA6E4}">
+                <adec:decorative xmlns:adec="http://schemas.microsoft.com/office/drawing/2017/decorative" val="1"/>
+              </a:ext>
+            </a:extLst>
+          </p:cNvPr>
+          <p:cNvGrpSpPr>
+            <a:grpSpLocks noGrp="1" noUngrp="1" noRot="1" noChangeAspect="1" noMove="1" noResize="1"/>
+          </p:cNvGrpSpPr>
+          <p:nvPr>
+            <p:extLst>
+              <p:ext uri="{386F3935-93C4-4BCD-93E2-E3B085C9AB24}">
+                <p16:designElem xmlns:p16="http://schemas.microsoft.com/office/powerpoint/2015/main" val="1"/>
+              </p:ext>
+            </p:extLst>
+          </p:nvPr>
+        </p:nvGrpSpPr>
+        <p:grpSpPr>
+          <a:xfrm>
+            <a:off x="10208171" y="4641753"/>
+            <a:ext cx="1128382" cy="847206"/>
+            <a:chOff x="8183879" y="1000124"/>
+            <a:chExt cx="1562267" cy="1172973"/>
+          </a:xfrm>
+        </p:grpSpPr>
+        <p:sp>
+          <p:nvSpPr>
+            <p:cNvPr id="14" name="Freeform 5">
+              <a:extLst>
+                <a:ext uri="{FF2B5EF4-FFF2-40B4-BE49-F238E27FC236}">
+                  <a16:creationId xmlns:a16="http://schemas.microsoft.com/office/drawing/2014/main" id="{A486C148-F247-4847-8096-6992A8A977A0}"/>
+                </a:ext>
+                <a:ext uri="{C183D7F6-B498-43B3-948B-1728B52AA6E4}">
+                  <adec:decorative xmlns:adec="http://schemas.microsoft.com/office/drawing/2017/decorative" val="1"/>
+                </a:ext>
+              </a:extLst>
+            </p:cNvPr>
+            <p:cNvSpPr>
+              <a:spLocks/>
+            </p:cNvSpPr>
+            <p:nvPr>
+              <p:extLst>
+                <p:ext uri="{386F3935-93C4-4BCD-93E2-E3B085C9AB24}">
+                  <p16:designElem xmlns:p16="http://schemas.microsoft.com/office/powerpoint/2015/main" val="1"/>
+                </p:ext>
+              </p:extLst>
+            </p:nvPr>
+          </p:nvSpPr>
+          <p:spPr bwMode="auto">
+            <a:xfrm>
+              <a:off x="8183879" y="1348782"/>
+              <a:ext cx="935037" cy="824315"/>
+            </a:xfrm>
+            <a:custGeom>
+              <a:avLst/>
+              <a:gdLst>
+                <a:gd name="T0" fmla="*/ 225 w 785"/>
+                <a:gd name="T1" fmla="*/ 692 h 692"/>
+                <a:gd name="T2" fmla="*/ 177 w 785"/>
+                <a:gd name="T3" fmla="*/ 665 h 692"/>
+                <a:gd name="T4" fmla="*/ 9 w 785"/>
+                <a:gd name="T5" fmla="*/ 374 h 692"/>
+                <a:gd name="T6" fmla="*/ 9 w 785"/>
+                <a:gd name="T7" fmla="*/ 318 h 692"/>
+                <a:gd name="T8" fmla="*/ 177 w 785"/>
+                <a:gd name="T9" fmla="*/ 27 h 692"/>
+                <a:gd name="T10" fmla="*/ 225 w 785"/>
+                <a:gd name="T11" fmla="*/ 0 h 692"/>
+                <a:gd name="T12" fmla="*/ 561 w 785"/>
+                <a:gd name="T13" fmla="*/ 0 h 692"/>
+                <a:gd name="T14" fmla="*/ 609 w 785"/>
+                <a:gd name="T15" fmla="*/ 27 h 692"/>
+                <a:gd name="T16" fmla="*/ 777 w 785"/>
+                <a:gd name="T17" fmla="*/ 318 h 692"/>
+                <a:gd name="T18" fmla="*/ 777 w 785"/>
+                <a:gd name="T19" fmla="*/ 374 h 692"/>
+                <a:gd name="T20" fmla="*/ 609 w 785"/>
+                <a:gd name="T21" fmla="*/ 665 h 692"/>
+                <a:gd name="T22" fmla="*/ 561 w 785"/>
+                <a:gd name="T23" fmla="*/ 692 h 692"/>
+                <a:gd name="T24" fmla="*/ 225 w 785"/>
+                <a:gd name="T25" fmla="*/ 692 h 692"/>
+              </a:gdLst>
+              <a:ahLst/>
+              <a:cxnLst>
+                <a:cxn ang="0">
+                  <a:pos x="T0" y="T1"/>
+                </a:cxn>
+                <a:cxn ang="0">
+                  <a:pos x="T2" y="T3"/>
+                </a:cxn>
+                <a:cxn ang="0">
+                  <a:pos x="T4" y="T5"/>
+                </a:cxn>
+                <a:cxn ang="0">
+                  <a:pos x="T6" y="T7"/>
+                </a:cxn>
+                <a:cxn ang="0">
+                  <a:pos x="T8" y="T9"/>
+                </a:cxn>
+                <a:cxn ang="0">
+                  <a:pos x="T10" y="T11"/>
+                </a:cxn>
+                <a:cxn ang="0">
+                  <a:pos x="T12" y="T13"/>
+                </a:cxn>
+                <a:cxn ang="0">
+                  <a:pos x="T14" y="T15"/>
+                </a:cxn>
+                <a:cxn ang="0">
+                  <a:pos x="T16" y="T17"/>
+                </a:cxn>
+                <a:cxn ang="0">
+                  <a:pos x="T18" y="T19"/>
+                </a:cxn>
+                <a:cxn ang="0">
+                  <a:pos x="T20" y="T21"/>
+                </a:cxn>
+                <a:cxn ang="0">
+                  <a:pos x="T22" y="T23"/>
+                </a:cxn>
+                <a:cxn ang="0">
+                  <a:pos x="T24" y="T25"/>
+                </a:cxn>
+              </a:cxnLst>
+              <a:rect l="0" t="0" r="r" b="b"/>
+              <a:pathLst>
+                <a:path w="785" h="692">
+                  <a:moveTo>
+                    <a:pt x="225" y="692"/>
+                  </a:moveTo>
+                  <a:cubicBezTo>
+                    <a:pt x="207" y="692"/>
+                    <a:pt x="185" y="680"/>
+                    <a:pt x="177" y="665"/>
+                  </a:cubicBezTo>
+                  <a:cubicBezTo>
+                    <a:pt x="9" y="374"/>
+                    <a:pt x="9" y="374"/>
+                    <a:pt x="9" y="374"/>
+                  </a:cubicBezTo>
+                  <a:cubicBezTo>
+                    <a:pt x="0" y="358"/>
+                    <a:pt x="0" y="334"/>
+                    <a:pt x="9" y="318"/>
+                  </a:cubicBezTo>
+                  <a:cubicBezTo>
+                    <a:pt x="177" y="27"/>
+                    <a:pt x="177" y="27"/>
+                    <a:pt x="177" y="27"/>
+                  </a:cubicBezTo>
+                  <a:cubicBezTo>
+                    <a:pt x="185" y="12"/>
+                    <a:pt x="207" y="0"/>
+                    <a:pt x="225" y="0"/>
+                  </a:cubicBezTo>
+                  <a:cubicBezTo>
+                    <a:pt x="561" y="0"/>
+                    <a:pt x="561" y="0"/>
+                    <a:pt x="561" y="0"/>
+                  </a:cubicBezTo>
+                  <a:cubicBezTo>
+                    <a:pt x="578" y="0"/>
+                    <a:pt x="600" y="12"/>
+                    <a:pt x="609" y="27"/>
+                  </a:cubicBezTo>
+                  <a:cubicBezTo>
+                    <a:pt x="777" y="318"/>
+                    <a:pt x="777" y="318"/>
+                    <a:pt x="777" y="318"/>
+                  </a:cubicBezTo>
+                  <a:cubicBezTo>
+                    <a:pt x="785" y="334"/>
+                    <a:pt x="785" y="358"/>
+                    <a:pt x="777" y="374"/>
+                  </a:cubicBezTo>
+                  <a:cubicBezTo>
+                    <a:pt x="609" y="665"/>
+                    <a:pt x="609" y="665"/>
+                    <a:pt x="609" y="665"/>
+                  </a:cubicBezTo>
+                  <a:cubicBezTo>
+                    <a:pt x="600" y="680"/>
+                    <a:pt x="578" y="692"/>
+                    <a:pt x="561" y="692"/>
+                  </a:cubicBezTo>
+                  <a:lnTo>
+                    <a:pt x="225" y="692"/>
+                  </a:lnTo>
+                  <a:close/>
+                </a:path>
+              </a:pathLst>
+            </a:custGeom>
+            <a:noFill/>
+            <a:ln w="28575" cmpd="sng">
+              <a:solidFill>
+                <a:schemeClr val="bg1"/>
+              </a:solidFill>
+            </a:ln>
+          </p:spPr>
+          <p:txBody>
+            <a:bodyPr vert="horz" wrap="square" lIns="91440" tIns="45720" rIns="91440" bIns="45720" numCol="1" anchor="t" anchorCtr="0" compatLnSpc="1">
+              <a:prstTxWarp prst="textNoShape">
+                <a:avLst/>
+              </a:prstTxWarp>
+            </a:bodyPr>
+            <a:lstStyle/>
+            <a:p>
+              <a:endParaRPr lang="en-US"/>
+            </a:p>
+          </p:txBody>
+        </p:sp>
+        <p:sp>
+          <p:nvSpPr>
+            <p:cNvPr id="15" name="Freeform 5">
+              <a:extLst>
+                <a:ext uri="{FF2B5EF4-FFF2-40B4-BE49-F238E27FC236}">
+                  <a16:creationId xmlns:a16="http://schemas.microsoft.com/office/drawing/2014/main" id="{F05C5920-B89E-417C-9583-B3DC913ADD78}"/>
+                </a:ext>
+                <a:ext uri="{C183D7F6-B498-43B3-948B-1728B52AA6E4}">
+                  <adec:decorative xmlns:adec="http://schemas.microsoft.com/office/drawing/2017/decorative" val="1"/>
+                </a:ext>
+              </a:extLst>
+            </p:cNvPr>
+            <p:cNvSpPr>
+              <a:spLocks/>
+            </p:cNvSpPr>
+            <p:nvPr>
+              <p:extLst>
+                <p:ext uri="{386F3935-93C4-4BCD-93E2-E3B085C9AB24}">
+                  <p16:designElem xmlns:p16="http://schemas.microsoft.com/office/powerpoint/2015/main" val="1"/>
+                </p:ext>
+              </p:extLst>
+            </p:nvPr>
+          </p:nvSpPr>
+          <p:spPr bwMode="auto">
+            <a:xfrm>
+              <a:off x="8983979" y="1000124"/>
+              <a:ext cx="762167" cy="671915"/>
+            </a:xfrm>
+            <a:custGeom>
+              <a:avLst/>
+              <a:gdLst>
+                <a:gd name="T0" fmla="*/ 225 w 785"/>
+                <a:gd name="T1" fmla="*/ 692 h 692"/>
+                <a:gd name="T2" fmla="*/ 177 w 785"/>
+                <a:gd name="T3" fmla="*/ 665 h 692"/>
+                <a:gd name="T4" fmla="*/ 9 w 785"/>
+                <a:gd name="T5" fmla="*/ 374 h 692"/>
+                <a:gd name="T6" fmla="*/ 9 w 785"/>
+                <a:gd name="T7" fmla="*/ 318 h 692"/>
+                <a:gd name="T8" fmla="*/ 177 w 785"/>
+                <a:gd name="T9" fmla="*/ 27 h 692"/>
+                <a:gd name="T10" fmla="*/ 225 w 785"/>
+                <a:gd name="T11" fmla="*/ 0 h 692"/>
+                <a:gd name="T12" fmla="*/ 561 w 785"/>
+                <a:gd name="T13" fmla="*/ 0 h 692"/>
+                <a:gd name="T14" fmla="*/ 609 w 785"/>
+                <a:gd name="T15" fmla="*/ 27 h 692"/>
+                <a:gd name="T16" fmla="*/ 777 w 785"/>
+                <a:gd name="T17" fmla="*/ 318 h 692"/>
+                <a:gd name="T18" fmla="*/ 777 w 785"/>
+                <a:gd name="T19" fmla="*/ 374 h 692"/>
+                <a:gd name="T20" fmla="*/ 609 w 785"/>
+                <a:gd name="T21" fmla="*/ 665 h 692"/>
+                <a:gd name="T22" fmla="*/ 561 w 785"/>
+                <a:gd name="T23" fmla="*/ 692 h 692"/>
+                <a:gd name="T24" fmla="*/ 225 w 785"/>
+                <a:gd name="T25" fmla="*/ 692 h 692"/>
+              </a:gdLst>
+              <a:ahLst/>
+              <a:cxnLst>
+                <a:cxn ang="0">
+                  <a:pos x="T0" y="T1"/>
+                </a:cxn>
+                <a:cxn ang="0">
+                  <a:pos x="T2" y="T3"/>
+                </a:cxn>
+                <a:cxn ang="0">
+                  <a:pos x="T4" y="T5"/>
+                </a:cxn>
+                <a:cxn ang="0">
+                  <a:pos x="T6" y="T7"/>
+                </a:cxn>
+                <a:cxn ang="0">
+                  <a:pos x="T8" y="T9"/>
+                </a:cxn>
+                <a:cxn ang="0">
+                  <a:pos x="T10" y="T11"/>
+                </a:cxn>
+                <a:cxn ang="0">
+                  <a:pos x="T12" y="T13"/>
+                </a:cxn>
+                <a:cxn ang="0">
+                  <a:pos x="T14" y="T15"/>
+                </a:cxn>
+                <a:cxn ang="0">
+                  <a:pos x="T16" y="T17"/>
+                </a:cxn>
+                <a:cxn ang="0">
+                  <a:pos x="T18" y="T19"/>
+                </a:cxn>
+                <a:cxn ang="0">
+                  <a:pos x="T20" y="T21"/>
+                </a:cxn>
+                <a:cxn ang="0">
+                  <a:pos x="T22" y="T23"/>
+                </a:cxn>
+                <a:cxn ang="0">
+                  <a:pos x="T24" y="T25"/>
+                </a:cxn>
+              </a:cxnLst>
+              <a:rect l="0" t="0" r="r" b="b"/>
+              <a:pathLst>
+                <a:path w="785" h="692">
+                  <a:moveTo>
+                    <a:pt x="225" y="692"/>
+                  </a:moveTo>
+                  <a:cubicBezTo>
+                    <a:pt x="207" y="692"/>
+                    <a:pt x="185" y="680"/>
+                    <a:pt x="177" y="665"/>
+                  </a:cubicBezTo>
+                  <a:cubicBezTo>
+                    <a:pt x="9" y="374"/>
+                    <a:pt x="9" y="374"/>
+                    <a:pt x="9" y="374"/>
+                  </a:cubicBezTo>
+                  <a:cubicBezTo>
+                    <a:pt x="0" y="358"/>
+                    <a:pt x="0" y="334"/>
+                    <a:pt x="9" y="318"/>
+                  </a:cubicBezTo>
+                  <a:cubicBezTo>
+                    <a:pt x="177" y="27"/>
+                    <a:pt x="177" y="27"/>
+                    <a:pt x="177" y="27"/>
+                  </a:cubicBezTo>
+                  <a:cubicBezTo>
+                    <a:pt x="185" y="12"/>
+                    <a:pt x="207" y="0"/>
+                    <a:pt x="225" y="0"/>
+                  </a:cubicBezTo>
+                  <a:cubicBezTo>
+                    <a:pt x="561" y="0"/>
+                    <a:pt x="561" y="0"/>
+                    <a:pt x="561" y="0"/>
+                  </a:cubicBezTo>
+                  <a:cubicBezTo>
+                    <a:pt x="578" y="0"/>
+                    <a:pt x="600" y="12"/>
+                    <a:pt x="609" y="27"/>
+                  </a:cubicBezTo>
+                  <a:cubicBezTo>
+                    <a:pt x="777" y="318"/>
+                    <a:pt x="777" y="318"/>
+                    <a:pt x="777" y="318"/>
+                  </a:cubicBezTo>
+                  <a:cubicBezTo>
+                    <a:pt x="785" y="334"/>
+                    <a:pt x="785" y="358"/>
+                    <a:pt x="777" y="374"/>
+                  </a:cubicBezTo>
+                  <a:cubicBezTo>
+                    <a:pt x="609" y="665"/>
+                    <a:pt x="609" y="665"/>
+                    <a:pt x="609" y="665"/>
+                  </a:cubicBezTo>
+                  <a:cubicBezTo>
+                    <a:pt x="600" y="680"/>
+                    <a:pt x="578" y="692"/>
+                    <a:pt x="561" y="692"/>
+                  </a:cubicBezTo>
+                  <a:lnTo>
+                    <a:pt x="225" y="692"/>
+                  </a:lnTo>
+                  <a:close/>
+                </a:path>
+              </a:pathLst>
+            </a:custGeom>
+            <a:noFill/>
+            <a:ln w="28575" cmpd="sng">
+              <a:solidFill>
+                <a:schemeClr val="bg1"/>
+              </a:solidFill>
+            </a:ln>
+          </p:spPr>
+          <p:txBody>
+            <a:bodyPr vert="horz" wrap="square" lIns="91440" tIns="45720" rIns="91440" bIns="45720" numCol="1" anchor="t" anchorCtr="0" compatLnSpc="1">
+              <a:prstTxWarp prst="textNoShape">
+                <a:avLst/>
+              </a:prstTxWarp>
+            </a:bodyPr>
+            <a:lstStyle/>
+            <a:p>
+              <a:endParaRPr lang="en-US"/>
+            </a:p>
+          </p:txBody>
+        </p:sp>
+      </p:grpSp>
+      <p:pic>
+        <p:nvPicPr>
+          <p:cNvPr id="4" name="Picture 3">
+            <a:extLst>
+              <a:ext uri="{FF2B5EF4-FFF2-40B4-BE49-F238E27FC236}">
+                <a16:creationId xmlns:a16="http://schemas.microsoft.com/office/drawing/2014/main" id="{E7058138-5755-43B2-9371-95842B58911B}"/>
+              </a:ext>
+            </a:extLst>
+          </p:cNvPr>
+          <p:cNvPicPr>
+            <a:picLocks noChangeAspect="1"/>
+          </p:cNvPicPr>
+          <p:nvPr/>
+        </p:nvPicPr>
+        <p:blipFill>
+          <a:blip r:embed="rId2"/>
+          <a:stretch>
+            <a:fillRect/>
+          </a:stretch>
+        </p:blipFill>
+        <p:spPr>
+          <a:xfrm>
+            <a:off x="1307363" y="2019404"/>
+            <a:ext cx="9478698" cy="1209844"/>
+          </a:xfrm>
+          <a:prstGeom prst="rect">
+            <a:avLst/>
+          </a:prstGeom>
+        </p:spPr>
+      </p:pic>
+    </p:spTree>
+    <p:extLst>
+      <p:ext uri="{BB962C8B-B14F-4D97-AF65-F5344CB8AC3E}">
+        <p14:creationId xmlns:p14="http://schemas.microsoft.com/office/powerpoint/2010/main" val="182257681"/>
+      </p:ext>
+    </p:extLst>
+  </p:cSld>
+  <p:clrMapOvr>
+    <a:masterClrMapping/>
+  </p:clrMapOvr>
+</p:sld>
+</file>
+
+<file path=ppt/slides/slide19.xml><?xml version="1.0" encoding="utf-8"?>
+<p:sld xmlns:a="http://schemas.openxmlformats.org/drawingml/2006/main" xmlns:r="http://schemas.openxmlformats.org/officeDocument/2006/relationships" xmlns:p="http://schemas.openxmlformats.org/presentationml/2006/main">
+  <p:cSld>
+    <p:bg>
+      <p:bgPr>
+        <a:solidFill>
+          <a:schemeClr val="bg1"/>
+        </a:solidFill>
+        <a:effectLst/>
+      </p:bgPr>
+    </p:bg>
+    <p:spTree>
+      <p:nvGrpSpPr>
+        <p:cNvPr id="1" name=""/>
+        <p:cNvGrpSpPr/>
+        <p:nvPr/>
+      </p:nvGrpSpPr>
+      <p:grpSpPr>
+        <a:xfrm>
+          <a:off x="0" y="0"/>
+          <a:ext cx="0" cy="0"/>
+          <a:chOff x="0" y="0"/>
+          <a:chExt cx="0" cy="0"/>
+        </a:xfrm>
+      </p:grpSpPr>
+      <p:sp useBgFill="1">
+        <p:nvSpPr>
+          <p:cNvPr id="9" name="Rectangle 8">
+            <a:extLst>
+              <a:ext uri="{FF2B5EF4-FFF2-40B4-BE49-F238E27FC236}">
+                <a16:creationId xmlns:a16="http://schemas.microsoft.com/office/drawing/2014/main" id="{E30408B7-02B2-4EC4-8EE8-B53E74642A86}"/>
+              </a:ext>
+              <a:ext uri="{C183D7F6-B498-43B3-948B-1728B52AA6E4}">
+                <adec:decorative xmlns:adec="http://schemas.microsoft.com/office/drawing/2017/decorative" val="1"/>
+              </a:ext>
+            </a:extLst>
+          </p:cNvPr>
+          <p:cNvSpPr>
+            <a:spLocks noGrp="1" noRot="1" noChangeAspect="1" noMove="1" noResize="1" noEditPoints="1" noAdjustHandles="1" noChangeArrowheads="1" noChangeShapeType="1" noTextEdit="1"/>
+          </p:cNvSpPr>
+          <p:nvPr>
+            <p:extLst>
+              <p:ext uri="{386F3935-93C4-4BCD-93E2-E3B085C9AB24}">
+                <p16:designElem xmlns:p16="http://schemas.microsoft.com/office/powerpoint/2015/main" val="1"/>
+              </p:ext>
+            </p:extLst>
+          </p:nvPr>
+        </p:nvSpPr>
+        <p:spPr>
+          <a:xfrm>
+            <a:off x="0" y="0"/>
+            <a:ext cx="12192000" cy="6858000"/>
+          </a:xfrm>
+          <a:prstGeom prst="rect">
+            <a:avLst/>
+          </a:prstGeom>
+          <a:ln>
+            <a:noFill/>
+          </a:ln>
+        </p:spPr>
+        <p:style>
+          <a:lnRef idx="2">
+            <a:schemeClr val="accent1">
+              <a:shade val="50000"/>
+            </a:schemeClr>
+          </a:lnRef>
+          <a:fillRef idx="1">
+            <a:schemeClr val="accent1"/>
+          </a:fillRef>
+          <a:effectRef idx="0">
+            <a:schemeClr val="accent1"/>
+          </a:effectRef>
+          <a:fontRef idx="minor">
+            <a:schemeClr val="lt1"/>
+          </a:fontRef>
+        </p:style>
+        <p:txBody>
+          <a:bodyPr rtlCol="0" anchor="ctr"/>
+          <a:lstStyle/>
+          <a:p>
+            <a:pPr algn="ctr"/>
+            <a:endParaRPr lang="en-US"/>
+          </a:p>
+        </p:txBody>
+      </p:sp>
+      <p:sp>
+        <p:nvSpPr>
+          <p:cNvPr id="11" name="Rectangle 10">
+            <a:extLst>
+              <a:ext uri="{FF2B5EF4-FFF2-40B4-BE49-F238E27FC236}">
+                <a16:creationId xmlns:a16="http://schemas.microsoft.com/office/drawing/2014/main" id="{FC117A00-E1E3-4C50-9444-14FB2BC778DD}"/>
+              </a:ext>
+              <a:ext uri="{C183D7F6-B498-43B3-948B-1728B52AA6E4}">
+                <adec:decorative xmlns:adec="http://schemas.microsoft.com/office/drawing/2017/decorative" val="1"/>
+              </a:ext>
+            </a:extLst>
+          </p:cNvPr>
+          <p:cNvSpPr>
+            <a:spLocks noGrp="1" noRot="1" noChangeAspect="1" noMove="1" noResize="1" noEditPoints="1" noAdjustHandles="1" noChangeArrowheads="1" noChangeShapeType="1" noTextEdit="1"/>
+          </p:cNvSpPr>
+          <p:nvPr>
+            <p:extLst>
+              <p:ext uri="{386F3935-93C4-4BCD-93E2-E3B085C9AB24}">
+                <p16:designElem xmlns:p16="http://schemas.microsoft.com/office/powerpoint/2015/main" val="1"/>
+              </p:ext>
+            </p:extLst>
+          </p:nvPr>
+        </p:nvSpPr>
+        <p:spPr>
+          <a:xfrm>
+            <a:off x="1" y="4233674"/>
+            <a:ext cx="12192000" cy="2624326"/>
+          </a:xfrm>
+          <a:prstGeom prst="rect">
+            <a:avLst/>
+          </a:prstGeom>
+          <a:solidFill>
+            <a:schemeClr val="tx1"/>
+          </a:solidFill>
+          <a:ln>
+            <a:noFill/>
+          </a:ln>
+        </p:spPr>
+        <p:style>
+          <a:lnRef idx="2">
+            <a:schemeClr val="accent1">
+              <a:shade val="50000"/>
+            </a:schemeClr>
+          </a:lnRef>
+          <a:fillRef idx="1">
+            <a:schemeClr val="accent1"/>
+          </a:fillRef>
+          <a:effectRef idx="0">
+            <a:schemeClr val="accent1"/>
+          </a:effectRef>
+          <a:fontRef idx="minor">
+            <a:schemeClr val="lt1"/>
+          </a:fontRef>
+        </p:style>
+        <p:txBody>
+          <a:bodyPr rtlCol="0" anchor="ctr"/>
+          <a:lstStyle/>
+          <a:p>
+            <a:pPr algn="ctr"/>
+            <a:endParaRPr lang="en-US"/>
+          </a:p>
+        </p:txBody>
+      </p:sp>
+      <p:sp>
+        <p:nvSpPr>
+          <p:cNvPr id="2" name="Title 1">
+            <a:extLst>
+              <a:ext uri="{FF2B5EF4-FFF2-40B4-BE49-F238E27FC236}">
+                <a16:creationId xmlns:a16="http://schemas.microsoft.com/office/drawing/2014/main" id="{5D782BE0-68E6-427B-9207-7869060ED289}"/>
+              </a:ext>
+            </a:extLst>
+          </p:cNvPr>
+          <p:cNvSpPr>
+            <a:spLocks noGrp="1"/>
+          </p:cNvSpPr>
+          <p:nvPr>
+            <p:ph type="title"/>
+          </p:nvPr>
+        </p:nvSpPr>
+        <p:spPr>
+          <a:xfrm>
+            <a:off x="965200" y="4428318"/>
+            <a:ext cx="8508512" cy="1274076"/>
+          </a:xfrm>
+        </p:spPr>
+        <p:txBody>
+          <a:bodyPr vert="horz" lIns="91440" tIns="45720" rIns="91440" bIns="45720" rtlCol="0" anchor="b">
+            <a:normAutofit/>
+          </a:bodyPr>
+          <a:lstStyle/>
+          <a:p>
+            <a:r>
+              <a:rPr lang="en-US" sz="6000" kern="1200" dirty="0">
+                <a:solidFill>
+                  <a:schemeClr val="bg1"/>
+                </a:solidFill>
+                <a:latin typeface="+mj-lt"/>
+                <a:ea typeface="+mj-ea"/>
+                <a:cs typeface="+mj-cs"/>
+              </a:rPr>
+              <a:t>Projection Matrix</a:t>
+            </a:r>
+          </a:p>
+        </p:txBody>
+      </p:sp>
+      <p:grpSp>
+        <p:nvGrpSpPr>
+          <p:cNvPr id="13" name="Group 12">
+            <a:extLst>
+              <a:ext uri="{FF2B5EF4-FFF2-40B4-BE49-F238E27FC236}">
+                <a16:creationId xmlns:a16="http://schemas.microsoft.com/office/drawing/2014/main" id="{3CA30F3A-949D-4014-A5BD-809F81E84132}"/>
+              </a:ext>
+              <a:ext uri="{C183D7F6-B498-43B3-948B-1728B52AA6E4}">
+                <adec:decorative xmlns:adec="http://schemas.microsoft.com/office/drawing/2017/decorative" val="1"/>
+              </a:ext>
+            </a:extLst>
+          </p:cNvPr>
+          <p:cNvGrpSpPr>
+            <a:grpSpLocks noGrp="1" noUngrp="1" noRot="1" noChangeAspect="1" noMove="1" noResize="1"/>
+          </p:cNvGrpSpPr>
+          <p:nvPr>
+            <p:extLst>
+              <p:ext uri="{386F3935-93C4-4BCD-93E2-E3B085C9AB24}">
+                <p16:designElem xmlns:p16="http://schemas.microsoft.com/office/powerpoint/2015/main" val="1"/>
+              </p:ext>
+            </p:extLst>
+          </p:nvPr>
+        </p:nvGrpSpPr>
+        <p:grpSpPr>
+          <a:xfrm>
+            <a:off x="10208171" y="4641753"/>
+            <a:ext cx="1128382" cy="847206"/>
+            <a:chOff x="8183879" y="1000124"/>
+            <a:chExt cx="1562267" cy="1172973"/>
+          </a:xfrm>
+        </p:grpSpPr>
+        <p:sp>
+          <p:nvSpPr>
+            <p:cNvPr id="14" name="Freeform 5">
+              <a:extLst>
+                <a:ext uri="{FF2B5EF4-FFF2-40B4-BE49-F238E27FC236}">
+                  <a16:creationId xmlns:a16="http://schemas.microsoft.com/office/drawing/2014/main" id="{A486C148-F247-4847-8096-6992A8A977A0}"/>
+                </a:ext>
+                <a:ext uri="{C183D7F6-B498-43B3-948B-1728B52AA6E4}">
+                  <adec:decorative xmlns:adec="http://schemas.microsoft.com/office/drawing/2017/decorative" val="1"/>
+                </a:ext>
+              </a:extLst>
+            </p:cNvPr>
+            <p:cNvSpPr>
+              <a:spLocks/>
+            </p:cNvSpPr>
+            <p:nvPr>
+              <p:extLst>
+                <p:ext uri="{386F3935-93C4-4BCD-93E2-E3B085C9AB24}">
+                  <p16:designElem xmlns:p16="http://schemas.microsoft.com/office/powerpoint/2015/main" val="1"/>
+                </p:ext>
+              </p:extLst>
+            </p:nvPr>
+          </p:nvSpPr>
+          <p:spPr bwMode="auto">
+            <a:xfrm>
+              <a:off x="8183879" y="1348782"/>
+              <a:ext cx="935037" cy="824315"/>
+            </a:xfrm>
+            <a:custGeom>
+              <a:avLst/>
+              <a:gdLst>
+                <a:gd name="T0" fmla="*/ 225 w 785"/>
+                <a:gd name="T1" fmla="*/ 692 h 692"/>
+                <a:gd name="T2" fmla="*/ 177 w 785"/>
+                <a:gd name="T3" fmla="*/ 665 h 692"/>
+                <a:gd name="T4" fmla="*/ 9 w 785"/>
+                <a:gd name="T5" fmla="*/ 374 h 692"/>
+                <a:gd name="T6" fmla="*/ 9 w 785"/>
+                <a:gd name="T7" fmla="*/ 318 h 692"/>
+                <a:gd name="T8" fmla="*/ 177 w 785"/>
+                <a:gd name="T9" fmla="*/ 27 h 692"/>
+                <a:gd name="T10" fmla="*/ 225 w 785"/>
+                <a:gd name="T11" fmla="*/ 0 h 692"/>
+                <a:gd name="T12" fmla="*/ 561 w 785"/>
+                <a:gd name="T13" fmla="*/ 0 h 692"/>
+                <a:gd name="T14" fmla="*/ 609 w 785"/>
+                <a:gd name="T15" fmla="*/ 27 h 692"/>
+                <a:gd name="T16" fmla="*/ 777 w 785"/>
+                <a:gd name="T17" fmla="*/ 318 h 692"/>
+                <a:gd name="T18" fmla="*/ 777 w 785"/>
+                <a:gd name="T19" fmla="*/ 374 h 692"/>
+                <a:gd name="T20" fmla="*/ 609 w 785"/>
+                <a:gd name="T21" fmla="*/ 665 h 692"/>
+                <a:gd name="T22" fmla="*/ 561 w 785"/>
+                <a:gd name="T23" fmla="*/ 692 h 692"/>
+                <a:gd name="T24" fmla="*/ 225 w 785"/>
+                <a:gd name="T25" fmla="*/ 692 h 692"/>
+              </a:gdLst>
+              <a:ahLst/>
+              <a:cxnLst>
+                <a:cxn ang="0">
+                  <a:pos x="T0" y="T1"/>
+                </a:cxn>
+                <a:cxn ang="0">
+                  <a:pos x="T2" y="T3"/>
+                </a:cxn>
+                <a:cxn ang="0">
+                  <a:pos x="T4" y="T5"/>
+                </a:cxn>
+                <a:cxn ang="0">
+                  <a:pos x="T6" y="T7"/>
+                </a:cxn>
+                <a:cxn ang="0">
+                  <a:pos x="T8" y="T9"/>
+                </a:cxn>
+                <a:cxn ang="0">
+                  <a:pos x="T10" y="T11"/>
+                </a:cxn>
+                <a:cxn ang="0">
+                  <a:pos x="T12" y="T13"/>
+                </a:cxn>
+                <a:cxn ang="0">
+                  <a:pos x="T14" y="T15"/>
+                </a:cxn>
+                <a:cxn ang="0">
+                  <a:pos x="T16" y="T17"/>
+                </a:cxn>
+                <a:cxn ang="0">
+                  <a:pos x="T18" y="T19"/>
+                </a:cxn>
+                <a:cxn ang="0">
+                  <a:pos x="T20" y="T21"/>
+                </a:cxn>
+                <a:cxn ang="0">
+                  <a:pos x="T22" y="T23"/>
+                </a:cxn>
+                <a:cxn ang="0">
+                  <a:pos x="T24" y="T25"/>
+                </a:cxn>
+              </a:cxnLst>
+              <a:rect l="0" t="0" r="r" b="b"/>
+              <a:pathLst>
+                <a:path w="785" h="692">
+                  <a:moveTo>
+                    <a:pt x="225" y="692"/>
+                  </a:moveTo>
+                  <a:cubicBezTo>
+                    <a:pt x="207" y="692"/>
+                    <a:pt x="185" y="680"/>
+                    <a:pt x="177" y="665"/>
+                  </a:cubicBezTo>
+                  <a:cubicBezTo>
+                    <a:pt x="9" y="374"/>
+                    <a:pt x="9" y="374"/>
+                    <a:pt x="9" y="374"/>
+                  </a:cubicBezTo>
+                  <a:cubicBezTo>
+                    <a:pt x="0" y="358"/>
+                    <a:pt x="0" y="334"/>
+                    <a:pt x="9" y="318"/>
+                  </a:cubicBezTo>
+                  <a:cubicBezTo>
+                    <a:pt x="177" y="27"/>
+                    <a:pt x="177" y="27"/>
+                    <a:pt x="177" y="27"/>
+                  </a:cubicBezTo>
+                  <a:cubicBezTo>
+                    <a:pt x="185" y="12"/>
+                    <a:pt x="207" y="0"/>
+                    <a:pt x="225" y="0"/>
+                  </a:cubicBezTo>
+                  <a:cubicBezTo>
+                    <a:pt x="561" y="0"/>
+                    <a:pt x="561" y="0"/>
+                    <a:pt x="561" y="0"/>
+                  </a:cubicBezTo>
+                  <a:cubicBezTo>
+                    <a:pt x="578" y="0"/>
+                    <a:pt x="600" y="12"/>
+                    <a:pt x="609" y="27"/>
+                  </a:cubicBezTo>
+                  <a:cubicBezTo>
+                    <a:pt x="777" y="318"/>
+                    <a:pt x="777" y="318"/>
+                    <a:pt x="777" y="318"/>
+                  </a:cubicBezTo>
+                  <a:cubicBezTo>
+                    <a:pt x="785" y="334"/>
+                    <a:pt x="785" y="358"/>
+                    <a:pt x="777" y="374"/>
+                  </a:cubicBezTo>
+                  <a:cubicBezTo>
+                    <a:pt x="609" y="665"/>
+                    <a:pt x="609" y="665"/>
+                    <a:pt x="609" y="665"/>
+                  </a:cubicBezTo>
+                  <a:cubicBezTo>
+                    <a:pt x="600" y="680"/>
+                    <a:pt x="578" y="692"/>
+                    <a:pt x="561" y="692"/>
+                  </a:cubicBezTo>
+                  <a:lnTo>
+                    <a:pt x="225" y="692"/>
+                  </a:lnTo>
+                  <a:close/>
+                </a:path>
+              </a:pathLst>
+            </a:custGeom>
+            <a:noFill/>
+            <a:ln w="28575" cmpd="sng">
+              <a:solidFill>
+                <a:schemeClr val="bg1"/>
+              </a:solidFill>
+            </a:ln>
+          </p:spPr>
+          <p:txBody>
+            <a:bodyPr vert="horz" wrap="square" lIns="91440" tIns="45720" rIns="91440" bIns="45720" numCol="1" anchor="t" anchorCtr="0" compatLnSpc="1">
+              <a:prstTxWarp prst="textNoShape">
+                <a:avLst/>
+              </a:prstTxWarp>
+            </a:bodyPr>
+            <a:lstStyle/>
+            <a:p>
+              <a:endParaRPr lang="en-US"/>
+            </a:p>
+          </p:txBody>
+        </p:sp>
+        <p:sp>
+          <p:nvSpPr>
+            <p:cNvPr id="15" name="Freeform 5">
+              <a:extLst>
+                <a:ext uri="{FF2B5EF4-FFF2-40B4-BE49-F238E27FC236}">
+                  <a16:creationId xmlns:a16="http://schemas.microsoft.com/office/drawing/2014/main" id="{F05C5920-B89E-417C-9583-B3DC913ADD78}"/>
+                </a:ext>
+                <a:ext uri="{C183D7F6-B498-43B3-948B-1728B52AA6E4}">
+                  <adec:decorative xmlns:adec="http://schemas.microsoft.com/office/drawing/2017/decorative" val="1"/>
+                </a:ext>
+              </a:extLst>
+            </p:cNvPr>
+            <p:cNvSpPr>
+              <a:spLocks/>
+            </p:cNvSpPr>
+            <p:nvPr>
+              <p:extLst>
+                <p:ext uri="{386F3935-93C4-4BCD-93E2-E3B085C9AB24}">
+                  <p16:designElem xmlns:p16="http://schemas.microsoft.com/office/powerpoint/2015/main" val="1"/>
+                </p:ext>
+              </p:extLst>
+            </p:nvPr>
+          </p:nvSpPr>
+          <p:spPr bwMode="auto">
+            <a:xfrm>
+              <a:off x="8983979" y="1000124"/>
+              <a:ext cx="762167" cy="671915"/>
+            </a:xfrm>
+            <a:custGeom>
+              <a:avLst/>
+              <a:gdLst>
+                <a:gd name="T0" fmla="*/ 225 w 785"/>
+                <a:gd name="T1" fmla="*/ 692 h 692"/>
+                <a:gd name="T2" fmla="*/ 177 w 785"/>
+                <a:gd name="T3" fmla="*/ 665 h 692"/>
+                <a:gd name="T4" fmla="*/ 9 w 785"/>
+                <a:gd name="T5" fmla="*/ 374 h 692"/>
+                <a:gd name="T6" fmla="*/ 9 w 785"/>
+                <a:gd name="T7" fmla="*/ 318 h 692"/>
+                <a:gd name="T8" fmla="*/ 177 w 785"/>
+                <a:gd name="T9" fmla="*/ 27 h 692"/>
+                <a:gd name="T10" fmla="*/ 225 w 785"/>
+                <a:gd name="T11" fmla="*/ 0 h 692"/>
+                <a:gd name="T12" fmla="*/ 561 w 785"/>
+                <a:gd name="T13" fmla="*/ 0 h 692"/>
+                <a:gd name="T14" fmla="*/ 609 w 785"/>
+                <a:gd name="T15" fmla="*/ 27 h 692"/>
+                <a:gd name="T16" fmla="*/ 777 w 785"/>
+                <a:gd name="T17" fmla="*/ 318 h 692"/>
+                <a:gd name="T18" fmla="*/ 777 w 785"/>
+                <a:gd name="T19" fmla="*/ 374 h 692"/>
+                <a:gd name="T20" fmla="*/ 609 w 785"/>
+                <a:gd name="T21" fmla="*/ 665 h 692"/>
+                <a:gd name="T22" fmla="*/ 561 w 785"/>
+                <a:gd name="T23" fmla="*/ 692 h 692"/>
+                <a:gd name="T24" fmla="*/ 225 w 785"/>
+                <a:gd name="T25" fmla="*/ 692 h 692"/>
+              </a:gdLst>
+              <a:ahLst/>
+              <a:cxnLst>
+                <a:cxn ang="0">
+                  <a:pos x="T0" y="T1"/>
+                </a:cxn>
+                <a:cxn ang="0">
+                  <a:pos x="T2" y="T3"/>
+                </a:cxn>
+                <a:cxn ang="0">
+                  <a:pos x="T4" y="T5"/>
+                </a:cxn>
+                <a:cxn ang="0">
+                  <a:pos x="T6" y="T7"/>
+                </a:cxn>
+                <a:cxn ang="0">
+                  <a:pos x="T8" y="T9"/>
+                </a:cxn>
+                <a:cxn ang="0">
+                  <a:pos x="T10" y="T11"/>
+                </a:cxn>
+                <a:cxn ang="0">
+                  <a:pos x="T12" y="T13"/>
+                </a:cxn>
+                <a:cxn ang="0">
+                  <a:pos x="T14" y="T15"/>
+                </a:cxn>
+                <a:cxn ang="0">
+                  <a:pos x="T16" y="T17"/>
+                </a:cxn>
+                <a:cxn ang="0">
+                  <a:pos x="T18" y="T19"/>
+                </a:cxn>
+                <a:cxn ang="0">
+                  <a:pos x="T20" y="T21"/>
+                </a:cxn>
+                <a:cxn ang="0">
+                  <a:pos x="T22" y="T23"/>
+                </a:cxn>
+                <a:cxn ang="0">
+                  <a:pos x="T24" y="T25"/>
+                </a:cxn>
+              </a:cxnLst>
+              <a:rect l="0" t="0" r="r" b="b"/>
+              <a:pathLst>
+                <a:path w="785" h="692">
+                  <a:moveTo>
+                    <a:pt x="225" y="692"/>
+                  </a:moveTo>
+                  <a:cubicBezTo>
+                    <a:pt x="207" y="692"/>
+                    <a:pt x="185" y="680"/>
+                    <a:pt x="177" y="665"/>
+                  </a:cubicBezTo>
+                  <a:cubicBezTo>
+                    <a:pt x="9" y="374"/>
+                    <a:pt x="9" y="374"/>
+                    <a:pt x="9" y="374"/>
+                  </a:cubicBezTo>
+                  <a:cubicBezTo>
+                    <a:pt x="0" y="358"/>
+                    <a:pt x="0" y="334"/>
+                    <a:pt x="9" y="318"/>
+                  </a:cubicBezTo>
+                  <a:cubicBezTo>
+                    <a:pt x="177" y="27"/>
+                    <a:pt x="177" y="27"/>
+                    <a:pt x="177" y="27"/>
+                  </a:cubicBezTo>
+                  <a:cubicBezTo>
+                    <a:pt x="185" y="12"/>
+                    <a:pt x="207" y="0"/>
+                    <a:pt x="225" y="0"/>
+                  </a:cubicBezTo>
+                  <a:cubicBezTo>
+                    <a:pt x="561" y="0"/>
+                    <a:pt x="561" y="0"/>
+                    <a:pt x="561" y="0"/>
+                  </a:cubicBezTo>
+                  <a:cubicBezTo>
+                    <a:pt x="578" y="0"/>
+                    <a:pt x="600" y="12"/>
+                    <a:pt x="609" y="27"/>
+                  </a:cubicBezTo>
+                  <a:cubicBezTo>
+                    <a:pt x="777" y="318"/>
+                    <a:pt x="777" y="318"/>
+                    <a:pt x="777" y="318"/>
+                  </a:cubicBezTo>
+                  <a:cubicBezTo>
+                    <a:pt x="785" y="334"/>
+                    <a:pt x="785" y="358"/>
+                    <a:pt x="777" y="374"/>
+                  </a:cubicBezTo>
+                  <a:cubicBezTo>
+                    <a:pt x="609" y="665"/>
+                    <a:pt x="609" y="665"/>
+                    <a:pt x="609" y="665"/>
+                  </a:cubicBezTo>
+                  <a:cubicBezTo>
+                    <a:pt x="600" y="680"/>
+                    <a:pt x="578" y="692"/>
+                    <a:pt x="561" y="692"/>
+                  </a:cubicBezTo>
+                  <a:lnTo>
+                    <a:pt x="225" y="692"/>
+                  </a:lnTo>
+                  <a:close/>
+                </a:path>
+              </a:pathLst>
+            </a:custGeom>
+            <a:noFill/>
+            <a:ln w="28575" cmpd="sng">
+              <a:solidFill>
+                <a:schemeClr val="bg1"/>
+              </a:solidFill>
+            </a:ln>
+          </p:spPr>
+          <p:txBody>
+            <a:bodyPr vert="horz" wrap="square" lIns="91440" tIns="45720" rIns="91440" bIns="45720" numCol="1" anchor="t" anchorCtr="0" compatLnSpc="1">
+              <a:prstTxWarp prst="textNoShape">
+                <a:avLst/>
+              </a:prstTxWarp>
+            </a:bodyPr>
+            <a:lstStyle/>
+            <a:p>
+              <a:endParaRPr lang="en-US"/>
+            </a:p>
+          </p:txBody>
+        </p:sp>
+      </p:grpSp>
+      <p:pic>
+        <p:nvPicPr>
+          <p:cNvPr id="5" name="Picture 4">
+            <a:extLst>
+              <a:ext uri="{FF2B5EF4-FFF2-40B4-BE49-F238E27FC236}">
+                <a16:creationId xmlns:a16="http://schemas.microsoft.com/office/drawing/2014/main" id="{D017CD1E-4953-4EED-9B6C-DDED7DE66DB1}"/>
+              </a:ext>
+            </a:extLst>
+          </p:cNvPr>
+          <p:cNvPicPr>
+            <a:picLocks noChangeAspect="1"/>
+          </p:cNvPicPr>
+          <p:nvPr/>
+        </p:nvPicPr>
+        <p:blipFill>
+          <a:blip r:embed="rId3"/>
+          <a:stretch>
+            <a:fillRect/>
+          </a:stretch>
+        </p:blipFill>
+        <p:spPr>
+          <a:xfrm>
+            <a:off x="1362075" y="1365901"/>
+            <a:ext cx="9467850" cy="2047875"/>
+          </a:xfrm>
+          <a:prstGeom prst="rect">
+            <a:avLst/>
+          </a:prstGeom>
+        </p:spPr>
+      </p:pic>
+    </p:spTree>
+    <p:extLst>
+      <p:ext uri="{BB962C8B-B14F-4D97-AF65-F5344CB8AC3E}">
+        <p14:creationId xmlns:p14="http://schemas.microsoft.com/office/powerpoint/2010/main" val="1810843605"/>
       </p:ext>
     </p:extLst>
   </p:cSld>

</xml_diff>